<commit_message>
Added the figure 9 ppt which is the histogram figure
</commit_message>
<xml_diff>
--- a/figure9.pptx
+++ b/figure9.pptx
@@ -7,7 +7,7 @@
   <p:sldIdLst>
     <p:sldId id="256" r:id="rId2"/>
   </p:sldIdLst>
-  <p:sldSz cx="9144000" cy="6858000" type="screen4x3"/>
+  <p:sldSz cx="8594725" cy="4572000"/>
   <p:notesSz cx="6858000" cy="9144000"/>
   <p:defaultTextStyle>
     <a:defPPr>
@@ -104,6 +104,22 @@
       </a:defRPr>
     </a:lvl9pPr>
   </p:defaultTextStyle>
+  <p:extLst>
+    <p:ext uri="{EFAFB233-063F-42B5-8137-9DF3F51BA10A}">
+      <p15:sldGuideLst xmlns:p15="http://schemas.microsoft.com/office/powerpoint/2012/main">
+        <p15:guide id="1" orient="horz" pos="1440" userDrawn="1">
+          <p15:clr>
+            <a:srgbClr val="A4A3A4"/>
+          </p15:clr>
+        </p15:guide>
+        <p15:guide id="2" pos="2707" userDrawn="1">
+          <p15:clr>
+            <a:srgbClr val="A4A3A4"/>
+          </p15:clr>
+        </p15:guide>
+      </p15:sldGuideLst>
+    </p:ext>
+  </p:extLst>
 </p:presentation>
 </file>
 
@@ -136,8 +152,8 @@
         </p:nvSpPr>
         <p:spPr>
           <a:xfrm>
-            <a:off x="685800" y="2130425"/>
-            <a:ext cx="7772400" cy="1470025"/>
+            <a:off x="644605" y="1420284"/>
+            <a:ext cx="7305516" cy="980017"/>
           </a:xfrm>
         </p:spPr>
         <p:txBody>
@@ -164,8 +180,8 @@
         </p:nvSpPr>
         <p:spPr>
           <a:xfrm>
-            <a:off x="1371600" y="3886200"/>
-            <a:ext cx="6400800" cy="1752600"/>
+            <a:off x="1289209" y="2590800"/>
+            <a:ext cx="6016308" cy="1168400"/>
           </a:xfrm>
         </p:spPr>
         <p:txBody>
@@ -181,7 +197,7 @@
                 </a:solidFill>
               </a:defRPr>
             </a:lvl1pPr>
-            <a:lvl2pPr marL="457200" indent="0" algn="ctr">
+            <a:lvl2pPr marL="304815" indent="0" algn="ctr">
               <a:buNone/>
               <a:defRPr>
                 <a:solidFill>
@@ -191,7 +207,7 @@
                 </a:solidFill>
               </a:defRPr>
             </a:lvl2pPr>
-            <a:lvl3pPr marL="914400" indent="0" algn="ctr">
+            <a:lvl3pPr marL="609630" indent="0" algn="ctr">
               <a:buNone/>
               <a:defRPr>
                 <a:solidFill>
@@ -201,7 +217,7 @@
                 </a:solidFill>
               </a:defRPr>
             </a:lvl3pPr>
-            <a:lvl4pPr marL="1371600" indent="0" algn="ctr">
+            <a:lvl4pPr marL="914446" indent="0" algn="ctr">
               <a:buNone/>
               <a:defRPr>
                 <a:solidFill>
@@ -211,7 +227,7 @@
                 </a:solidFill>
               </a:defRPr>
             </a:lvl4pPr>
-            <a:lvl5pPr marL="1828800" indent="0" algn="ctr">
+            <a:lvl5pPr marL="1219261" indent="0" algn="ctr">
               <a:buNone/>
               <a:defRPr>
                 <a:solidFill>
@@ -221,7 +237,7 @@
                 </a:solidFill>
               </a:defRPr>
             </a:lvl5pPr>
-            <a:lvl6pPr marL="2286000" indent="0" algn="ctr">
+            <a:lvl6pPr marL="1524076" indent="0" algn="ctr">
               <a:buNone/>
               <a:defRPr>
                 <a:solidFill>
@@ -231,7 +247,7 @@
                 </a:solidFill>
               </a:defRPr>
             </a:lvl6pPr>
-            <a:lvl7pPr marL="2743200" indent="0" algn="ctr">
+            <a:lvl7pPr marL="1828891" indent="0" algn="ctr">
               <a:buNone/>
               <a:defRPr>
                 <a:solidFill>
@@ -241,7 +257,7 @@
                 </a:solidFill>
               </a:defRPr>
             </a:lvl7pPr>
-            <a:lvl8pPr marL="3200400" indent="0" algn="ctr">
+            <a:lvl8pPr marL="2133707" indent="0" algn="ctr">
               <a:buNone/>
               <a:defRPr>
                 <a:solidFill>
@@ -251,7 +267,7 @@
                 </a:solidFill>
               </a:defRPr>
             </a:lvl8pPr>
-            <a:lvl9pPr marL="3657600" indent="0" algn="ctr">
+            <a:lvl9pPr marL="2438522" indent="0" algn="ctr">
               <a:buNone/>
               <a:defRPr>
                 <a:solidFill>
@@ -288,7 +304,7 @@
           <a:p>
             <a:fld id="{4BAFBD1D-7023-4800-B461-8C067D44DA82}" type="datetimeFigureOut">
               <a:rPr lang="en-US" smtClean="0"/>
-              <a:t>9/25/2014</a:t>
+              <a:t>9/26/2014</a:t>
             </a:fld>
             <a:endParaRPr lang="en-US"/>
           </a:p>
@@ -458,7 +474,7 @@
           <a:p>
             <a:fld id="{4BAFBD1D-7023-4800-B461-8C067D44DA82}" type="datetimeFigureOut">
               <a:rPr lang="en-US" smtClean="0"/>
-              <a:t>9/25/2014</a:t>
+              <a:t>9/26/2014</a:t>
             </a:fld>
             <a:endParaRPr lang="en-US"/>
           </a:p>
@@ -548,8 +564,8 @@
         </p:nvSpPr>
         <p:spPr>
           <a:xfrm>
-            <a:off x="6629400" y="274638"/>
-            <a:ext cx="2057400" cy="5851525"/>
+            <a:off x="6231177" y="183095"/>
+            <a:ext cx="1933813" cy="3901017"/>
           </a:xfrm>
         </p:spPr>
         <p:txBody>
@@ -576,8 +592,8 @@
         </p:nvSpPr>
         <p:spPr>
           <a:xfrm>
-            <a:off x="457200" y="274638"/>
-            <a:ext cx="6019800" cy="5851525"/>
+            <a:off x="429736" y="183095"/>
+            <a:ext cx="5658194" cy="3901017"/>
           </a:xfrm>
         </p:spPr>
         <p:txBody>
@@ -638,7 +654,7 @@
           <a:p>
             <a:fld id="{4BAFBD1D-7023-4800-B461-8C067D44DA82}" type="datetimeFigureOut">
               <a:rPr lang="en-US" smtClean="0"/>
-              <a:t>9/25/2014</a:t>
+              <a:t>9/26/2014</a:t>
             </a:fld>
             <a:endParaRPr lang="en-US"/>
           </a:p>
@@ -808,7 +824,7 @@
           <a:p>
             <a:fld id="{4BAFBD1D-7023-4800-B461-8C067D44DA82}" type="datetimeFigureOut">
               <a:rPr lang="en-US" smtClean="0"/>
-              <a:t>9/25/2014</a:t>
+              <a:t>9/26/2014</a:t>
             </a:fld>
             <a:endParaRPr lang="en-US"/>
           </a:p>
@@ -898,15 +914,15 @@
         </p:nvSpPr>
         <p:spPr>
           <a:xfrm>
-            <a:off x="722313" y="4406900"/>
-            <a:ext cx="7772400" cy="1362075"/>
+            <a:off x="678924" y="2937934"/>
+            <a:ext cx="7305516" cy="908050"/>
           </a:xfrm>
         </p:spPr>
         <p:txBody>
           <a:bodyPr anchor="t"/>
           <a:lstStyle>
             <a:lvl1pPr algn="l">
-              <a:defRPr sz="4000" b="1" cap="all"/>
+              <a:defRPr sz="2667" b="1" cap="all"/>
             </a:lvl1pPr>
           </a:lstStyle>
           <a:p>
@@ -930,8 +946,8 @@
         </p:nvSpPr>
         <p:spPr>
           <a:xfrm>
-            <a:off x="722313" y="2906713"/>
-            <a:ext cx="7772400" cy="1500187"/>
+            <a:off x="678924" y="1937812"/>
+            <a:ext cx="7305516" cy="1000125"/>
           </a:xfrm>
         </p:spPr>
         <p:txBody>
@@ -939,7 +955,7 @@
           <a:lstStyle>
             <a:lvl1pPr marL="0" indent="0">
               <a:buNone/>
-              <a:defRPr sz="2000">
+              <a:defRPr sz="1333">
                 <a:solidFill>
                   <a:schemeClr val="tx1">
                     <a:tint val="75000"/>
@@ -947,9 +963,9 @@
                 </a:solidFill>
               </a:defRPr>
             </a:lvl1pPr>
-            <a:lvl2pPr marL="457200" indent="0">
-              <a:buNone/>
-              <a:defRPr sz="1800">
+            <a:lvl2pPr marL="304815" indent="0">
+              <a:buNone/>
+              <a:defRPr sz="1200">
                 <a:solidFill>
                   <a:schemeClr val="tx1">
                     <a:tint val="75000"/>
@@ -957,9 +973,9 @@
                 </a:solidFill>
               </a:defRPr>
             </a:lvl2pPr>
-            <a:lvl3pPr marL="914400" indent="0">
-              <a:buNone/>
-              <a:defRPr sz="1600">
+            <a:lvl3pPr marL="609630" indent="0">
+              <a:buNone/>
+              <a:defRPr sz="1067">
                 <a:solidFill>
                   <a:schemeClr val="tx1">
                     <a:tint val="75000"/>
@@ -967,9 +983,9 @@
                 </a:solidFill>
               </a:defRPr>
             </a:lvl3pPr>
-            <a:lvl4pPr marL="1371600" indent="0">
-              <a:buNone/>
-              <a:defRPr sz="1400">
+            <a:lvl4pPr marL="914446" indent="0">
+              <a:buNone/>
+              <a:defRPr sz="933">
                 <a:solidFill>
                   <a:schemeClr val="tx1">
                     <a:tint val="75000"/>
@@ -977,9 +993,9 @@
                 </a:solidFill>
               </a:defRPr>
             </a:lvl4pPr>
-            <a:lvl5pPr marL="1828800" indent="0">
-              <a:buNone/>
-              <a:defRPr sz="1400">
+            <a:lvl5pPr marL="1219261" indent="0">
+              <a:buNone/>
+              <a:defRPr sz="933">
                 <a:solidFill>
                   <a:schemeClr val="tx1">
                     <a:tint val="75000"/>
@@ -987,9 +1003,9 @@
                 </a:solidFill>
               </a:defRPr>
             </a:lvl5pPr>
-            <a:lvl6pPr marL="2286000" indent="0">
-              <a:buNone/>
-              <a:defRPr sz="1400">
+            <a:lvl6pPr marL="1524076" indent="0">
+              <a:buNone/>
+              <a:defRPr sz="933">
                 <a:solidFill>
                   <a:schemeClr val="tx1">
                     <a:tint val="75000"/>
@@ -997,9 +1013,9 @@
                 </a:solidFill>
               </a:defRPr>
             </a:lvl6pPr>
-            <a:lvl7pPr marL="2743200" indent="0">
-              <a:buNone/>
-              <a:defRPr sz="1400">
+            <a:lvl7pPr marL="1828891" indent="0">
+              <a:buNone/>
+              <a:defRPr sz="933">
                 <a:solidFill>
                   <a:schemeClr val="tx1">
                     <a:tint val="75000"/>
@@ -1007,9 +1023,9 @@
                 </a:solidFill>
               </a:defRPr>
             </a:lvl7pPr>
-            <a:lvl8pPr marL="3200400" indent="0">
-              <a:buNone/>
-              <a:defRPr sz="1400">
+            <a:lvl8pPr marL="2133707" indent="0">
+              <a:buNone/>
+              <a:defRPr sz="933">
                 <a:solidFill>
                   <a:schemeClr val="tx1">
                     <a:tint val="75000"/>
@@ -1017,9 +1033,9 @@
                 </a:solidFill>
               </a:defRPr>
             </a:lvl8pPr>
-            <a:lvl9pPr marL="3657600" indent="0">
-              <a:buNone/>
-              <a:defRPr sz="1400">
+            <a:lvl9pPr marL="2438522" indent="0">
+              <a:buNone/>
+              <a:defRPr sz="933">
                 <a:solidFill>
                   <a:schemeClr val="tx1">
                     <a:tint val="75000"/>
@@ -1054,7 +1070,7 @@
           <a:p>
             <a:fld id="{4BAFBD1D-7023-4800-B461-8C067D44DA82}" type="datetimeFigureOut">
               <a:rPr lang="en-US" smtClean="0"/>
-              <a:t>9/25/2014</a:t>
+              <a:t>9/26/2014</a:t>
             </a:fld>
             <a:endParaRPr lang="en-US"/>
           </a:p>
@@ -1167,39 +1183,39 @@
         </p:nvSpPr>
         <p:spPr>
           <a:xfrm>
-            <a:off x="457200" y="1600200"/>
-            <a:ext cx="4038600" cy="4525963"/>
+            <a:off x="429736" y="1066803"/>
+            <a:ext cx="3796004" cy="3017309"/>
           </a:xfrm>
         </p:spPr>
         <p:txBody>
           <a:bodyPr/>
           <a:lstStyle>
             <a:lvl1pPr>
-              <a:defRPr sz="2800"/>
+              <a:defRPr sz="1867"/>
             </a:lvl1pPr>
             <a:lvl2pPr>
-              <a:defRPr sz="2400"/>
+              <a:defRPr sz="1600"/>
             </a:lvl2pPr>
             <a:lvl3pPr>
-              <a:defRPr sz="2000"/>
+              <a:defRPr sz="1333"/>
             </a:lvl3pPr>
             <a:lvl4pPr>
-              <a:defRPr sz="1800"/>
+              <a:defRPr sz="1200"/>
             </a:lvl4pPr>
             <a:lvl5pPr>
-              <a:defRPr sz="1800"/>
+              <a:defRPr sz="1200"/>
             </a:lvl5pPr>
             <a:lvl6pPr>
-              <a:defRPr sz="1800"/>
+              <a:defRPr sz="1200"/>
             </a:lvl6pPr>
             <a:lvl7pPr>
-              <a:defRPr sz="1800"/>
+              <a:defRPr sz="1200"/>
             </a:lvl7pPr>
             <a:lvl8pPr>
-              <a:defRPr sz="1800"/>
+              <a:defRPr sz="1200"/>
             </a:lvl8pPr>
             <a:lvl9pPr>
-              <a:defRPr sz="1800"/>
+              <a:defRPr sz="1200"/>
             </a:lvl9pPr>
           </a:lstStyle>
           <a:p>
@@ -1252,39 +1268,39 @@
         </p:nvSpPr>
         <p:spPr>
           <a:xfrm>
-            <a:off x="4648200" y="1600200"/>
-            <a:ext cx="4038600" cy="4525963"/>
+            <a:off x="4368985" y="1066803"/>
+            <a:ext cx="3796004" cy="3017309"/>
           </a:xfrm>
         </p:spPr>
         <p:txBody>
           <a:bodyPr/>
           <a:lstStyle>
             <a:lvl1pPr>
-              <a:defRPr sz="2800"/>
+              <a:defRPr sz="1867"/>
             </a:lvl1pPr>
             <a:lvl2pPr>
-              <a:defRPr sz="2400"/>
+              <a:defRPr sz="1600"/>
             </a:lvl2pPr>
             <a:lvl3pPr>
-              <a:defRPr sz="2000"/>
+              <a:defRPr sz="1333"/>
             </a:lvl3pPr>
             <a:lvl4pPr>
-              <a:defRPr sz="1800"/>
+              <a:defRPr sz="1200"/>
             </a:lvl4pPr>
             <a:lvl5pPr>
-              <a:defRPr sz="1800"/>
+              <a:defRPr sz="1200"/>
             </a:lvl5pPr>
             <a:lvl6pPr>
-              <a:defRPr sz="1800"/>
+              <a:defRPr sz="1200"/>
             </a:lvl6pPr>
             <a:lvl7pPr>
-              <a:defRPr sz="1800"/>
+              <a:defRPr sz="1200"/>
             </a:lvl7pPr>
             <a:lvl8pPr>
-              <a:defRPr sz="1800"/>
+              <a:defRPr sz="1200"/>
             </a:lvl8pPr>
             <a:lvl9pPr>
-              <a:defRPr sz="1800"/>
+              <a:defRPr sz="1200"/>
             </a:lvl9pPr>
           </a:lstStyle>
           <a:p>
@@ -1342,7 +1358,7 @@
           <a:p>
             <a:fld id="{4BAFBD1D-7023-4800-B461-8C067D44DA82}" type="datetimeFigureOut">
               <a:rPr lang="en-US" smtClean="0"/>
-              <a:t>9/25/2014</a:t>
+              <a:t>9/26/2014</a:t>
             </a:fld>
             <a:endParaRPr lang="en-US"/>
           </a:p>
@@ -1459,8 +1475,8 @@
         </p:nvSpPr>
         <p:spPr>
           <a:xfrm>
-            <a:off x="457200" y="1535113"/>
-            <a:ext cx="4040188" cy="639762"/>
+            <a:off x="429737" y="1023409"/>
+            <a:ext cx="3797497" cy="426508"/>
           </a:xfrm>
         </p:spPr>
         <p:txBody>
@@ -1468,39 +1484,39 @@
           <a:lstStyle>
             <a:lvl1pPr marL="0" indent="0">
               <a:buNone/>
-              <a:defRPr sz="2400" b="1"/>
+              <a:defRPr sz="1600" b="1"/>
             </a:lvl1pPr>
-            <a:lvl2pPr marL="457200" indent="0">
-              <a:buNone/>
-              <a:defRPr sz="2000" b="1"/>
+            <a:lvl2pPr marL="304815" indent="0">
+              <a:buNone/>
+              <a:defRPr sz="1333" b="1"/>
             </a:lvl2pPr>
-            <a:lvl3pPr marL="914400" indent="0">
-              <a:buNone/>
-              <a:defRPr sz="1800" b="1"/>
+            <a:lvl3pPr marL="609630" indent="0">
+              <a:buNone/>
+              <a:defRPr sz="1200" b="1"/>
             </a:lvl3pPr>
-            <a:lvl4pPr marL="1371600" indent="0">
-              <a:buNone/>
-              <a:defRPr sz="1600" b="1"/>
+            <a:lvl4pPr marL="914446" indent="0">
+              <a:buNone/>
+              <a:defRPr sz="1067" b="1"/>
             </a:lvl4pPr>
-            <a:lvl5pPr marL="1828800" indent="0">
-              <a:buNone/>
-              <a:defRPr sz="1600" b="1"/>
+            <a:lvl5pPr marL="1219261" indent="0">
+              <a:buNone/>
+              <a:defRPr sz="1067" b="1"/>
             </a:lvl5pPr>
-            <a:lvl6pPr marL="2286000" indent="0">
-              <a:buNone/>
-              <a:defRPr sz="1600" b="1"/>
+            <a:lvl6pPr marL="1524076" indent="0">
+              <a:buNone/>
+              <a:defRPr sz="1067" b="1"/>
             </a:lvl6pPr>
-            <a:lvl7pPr marL="2743200" indent="0">
-              <a:buNone/>
-              <a:defRPr sz="1600" b="1"/>
+            <a:lvl7pPr marL="1828891" indent="0">
+              <a:buNone/>
+              <a:defRPr sz="1067" b="1"/>
             </a:lvl7pPr>
-            <a:lvl8pPr marL="3200400" indent="0">
-              <a:buNone/>
-              <a:defRPr sz="1600" b="1"/>
+            <a:lvl8pPr marL="2133707" indent="0">
+              <a:buNone/>
+              <a:defRPr sz="1067" b="1"/>
             </a:lvl8pPr>
-            <a:lvl9pPr marL="3657600" indent="0">
-              <a:buNone/>
-              <a:defRPr sz="1600" b="1"/>
+            <a:lvl9pPr marL="2438522" indent="0">
+              <a:buNone/>
+              <a:defRPr sz="1067" b="1"/>
             </a:lvl9pPr>
           </a:lstStyle>
           <a:p>
@@ -1524,39 +1540,39 @@
         </p:nvSpPr>
         <p:spPr>
           <a:xfrm>
-            <a:off x="457200" y="2174875"/>
-            <a:ext cx="4040188" cy="3951288"/>
+            <a:off x="429737" y="1449917"/>
+            <a:ext cx="3797497" cy="2634192"/>
           </a:xfrm>
         </p:spPr>
         <p:txBody>
           <a:bodyPr/>
           <a:lstStyle>
             <a:lvl1pPr>
-              <a:defRPr sz="2400"/>
+              <a:defRPr sz="1600"/>
             </a:lvl1pPr>
             <a:lvl2pPr>
-              <a:defRPr sz="2000"/>
+              <a:defRPr sz="1333"/>
             </a:lvl2pPr>
             <a:lvl3pPr>
-              <a:defRPr sz="1800"/>
+              <a:defRPr sz="1200"/>
             </a:lvl3pPr>
             <a:lvl4pPr>
-              <a:defRPr sz="1600"/>
+              <a:defRPr sz="1067"/>
             </a:lvl4pPr>
             <a:lvl5pPr>
-              <a:defRPr sz="1600"/>
+              <a:defRPr sz="1067"/>
             </a:lvl5pPr>
             <a:lvl6pPr>
-              <a:defRPr sz="1600"/>
+              <a:defRPr sz="1067"/>
             </a:lvl6pPr>
             <a:lvl7pPr>
-              <a:defRPr sz="1600"/>
+              <a:defRPr sz="1067"/>
             </a:lvl7pPr>
             <a:lvl8pPr>
-              <a:defRPr sz="1600"/>
+              <a:defRPr sz="1067"/>
             </a:lvl8pPr>
             <a:lvl9pPr>
-              <a:defRPr sz="1600"/>
+              <a:defRPr sz="1067"/>
             </a:lvl9pPr>
           </a:lstStyle>
           <a:p>
@@ -1609,8 +1625,8 @@
         </p:nvSpPr>
         <p:spPr>
           <a:xfrm>
-            <a:off x="4645025" y="1535113"/>
-            <a:ext cx="4041775" cy="639762"/>
+            <a:off x="4366003" y="1023409"/>
+            <a:ext cx="3798988" cy="426508"/>
           </a:xfrm>
         </p:spPr>
         <p:txBody>
@@ -1618,39 +1634,39 @@
           <a:lstStyle>
             <a:lvl1pPr marL="0" indent="0">
               <a:buNone/>
-              <a:defRPr sz="2400" b="1"/>
+              <a:defRPr sz="1600" b="1"/>
             </a:lvl1pPr>
-            <a:lvl2pPr marL="457200" indent="0">
-              <a:buNone/>
-              <a:defRPr sz="2000" b="1"/>
+            <a:lvl2pPr marL="304815" indent="0">
+              <a:buNone/>
+              <a:defRPr sz="1333" b="1"/>
             </a:lvl2pPr>
-            <a:lvl3pPr marL="914400" indent="0">
-              <a:buNone/>
-              <a:defRPr sz="1800" b="1"/>
+            <a:lvl3pPr marL="609630" indent="0">
+              <a:buNone/>
+              <a:defRPr sz="1200" b="1"/>
             </a:lvl3pPr>
-            <a:lvl4pPr marL="1371600" indent="0">
-              <a:buNone/>
-              <a:defRPr sz="1600" b="1"/>
+            <a:lvl4pPr marL="914446" indent="0">
+              <a:buNone/>
+              <a:defRPr sz="1067" b="1"/>
             </a:lvl4pPr>
-            <a:lvl5pPr marL="1828800" indent="0">
-              <a:buNone/>
-              <a:defRPr sz="1600" b="1"/>
+            <a:lvl5pPr marL="1219261" indent="0">
+              <a:buNone/>
+              <a:defRPr sz="1067" b="1"/>
             </a:lvl5pPr>
-            <a:lvl6pPr marL="2286000" indent="0">
-              <a:buNone/>
-              <a:defRPr sz="1600" b="1"/>
+            <a:lvl6pPr marL="1524076" indent="0">
+              <a:buNone/>
+              <a:defRPr sz="1067" b="1"/>
             </a:lvl6pPr>
-            <a:lvl7pPr marL="2743200" indent="0">
-              <a:buNone/>
-              <a:defRPr sz="1600" b="1"/>
+            <a:lvl7pPr marL="1828891" indent="0">
+              <a:buNone/>
+              <a:defRPr sz="1067" b="1"/>
             </a:lvl7pPr>
-            <a:lvl8pPr marL="3200400" indent="0">
-              <a:buNone/>
-              <a:defRPr sz="1600" b="1"/>
+            <a:lvl8pPr marL="2133707" indent="0">
+              <a:buNone/>
+              <a:defRPr sz="1067" b="1"/>
             </a:lvl8pPr>
-            <a:lvl9pPr marL="3657600" indent="0">
-              <a:buNone/>
-              <a:defRPr sz="1600" b="1"/>
+            <a:lvl9pPr marL="2438522" indent="0">
+              <a:buNone/>
+              <a:defRPr sz="1067" b="1"/>
             </a:lvl9pPr>
           </a:lstStyle>
           <a:p>
@@ -1674,39 +1690,39 @@
         </p:nvSpPr>
         <p:spPr>
           <a:xfrm>
-            <a:off x="4645025" y="2174875"/>
-            <a:ext cx="4041775" cy="3951288"/>
+            <a:off x="4366003" y="1449917"/>
+            <a:ext cx="3798988" cy="2634192"/>
           </a:xfrm>
         </p:spPr>
         <p:txBody>
           <a:bodyPr/>
           <a:lstStyle>
             <a:lvl1pPr>
-              <a:defRPr sz="2400"/>
+              <a:defRPr sz="1600"/>
             </a:lvl1pPr>
             <a:lvl2pPr>
-              <a:defRPr sz="2000"/>
+              <a:defRPr sz="1333"/>
             </a:lvl2pPr>
             <a:lvl3pPr>
-              <a:defRPr sz="1800"/>
+              <a:defRPr sz="1200"/>
             </a:lvl3pPr>
             <a:lvl4pPr>
-              <a:defRPr sz="1600"/>
+              <a:defRPr sz="1067"/>
             </a:lvl4pPr>
             <a:lvl5pPr>
-              <a:defRPr sz="1600"/>
+              <a:defRPr sz="1067"/>
             </a:lvl5pPr>
             <a:lvl6pPr>
-              <a:defRPr sz="1600"/>
+              <a:defRPr sz="1067"/>
             </a:lvl6pPr>
             <a:lvl7pPr>
-              <a:defRPr sz="1600"/>
+              <a:defRPr sz="1067"/>
             </a:lvl7pPr>
             <a:lvl8pPr>
-              <a:defRPr sz="1600"/>
+              <a:defRPr sz="1067"/>
             </a:lvl8pPr>
             <a:lvl9pPr>
-              <a:defRPr sz="1600"/>
+              <a:defRPr sz="1067"/>
             </a:lvl9pPr>
           </a:lstStyle>
           <a:p>
@@ -1764,7 +1780,7 @@
           <a:p>
             <a:fld id="{4BAFBD1D-7023-4800-B461-8C067D44DA82}" type="datetimeFigureOut">
               <a:rPr lang="en-US" smtClean="0"/>
-              <a:t>9/25/2014</a:t>
+              <a:t>9/26/2014</a:t>
             </a:fld>
             <a:endParaRPr lang="en-US"/>
           </a:p>
@@ -1882,7 +1898,7 @@
           <a:p>
             <a:fld id="{4BAFBD1D-7023-4800-B461-8C067D44DA82}" type="datetimeFigureOut">
               <a:rPr lang="en-US" smtClean="0"/>
-              <a:t>9/25/2014</a:t>
+              <a:t>9/26/2014</a:t>
             </a:fld>
             <a:endParaRPr lang="en-US"/>
           </a:p>
@@ -1977,7 +1993,7 @@
           <a:p>
             <a:fld id="{4BAFBD1D-7023-4800-B461-8C067D44DA82}" type="datetimeFigureOut">
               <a:rPr lang="en-US" smtClean="0"/>
-              <a:t>9/25/2014</a:t>
+              <a:t>9/26/2014</a:t>
             </a:fld>
             <a:endParaRPr lang="en-US"/>
           </a:p>
@@ -2067,15 +2083,15 @@
         </p:nvSpPr>
         <p:spPr>
           <a:xfrm>
-            <a:off x="457200" y="273050"/>
-            <a:ext cx="3008313" cy="1162050"/>
+            <a:off x="429739" y="182033"/>
+            <a:ext cx="2827605" cy="774700"/>
           </a:xfrm>
         </p:spPr>
         <p:txBody>
           <a:bodyPr anchor="b"/>
           <a:lstStyle>
             <a:lvl1pPr algn="l">
-              <a:defRPr sz="2000" b="1"/>
+              <a:defRPr sz="1333" b="1"/>
             </a:lvl1pPr>
           </a:lstStyle>
           <a:p>
@@ -2099,39 +2115,39 @@
         </p:nvSpPr>
         <p:spPr>
           <a:xfrm>
-            <a:off x="3575050" y="273050"/>
-            <a:ext cx="5111750" cy="5853113"/>
+            <a:off x="3360299" y="182037"/>
+            <a:ext cx="4804691" cy="3902075"/>
           </a:xfrm>
         </p:spPr>
         <p:txBody>
           <a:bodyPr/>
           <a:lstStyle>
             <a:lvl1pPr>
-              <a:defRPr sz="3200"/>
+              <a:defRPr sz="2133"/>
             </a:lvl1pPr>
             <a:lvl2pPr>
-              <a:defRPr sz="2800"/>
+              <a:defRPr sz="1867"/>
             </a:lvl2pPr>
             <a:lvl3pPr>
-              <a:defRPr sz="2400"/>
+              <a:defRPr sz="1600"/>
             </a:lvl3pPr>
             <a:lvl4pPr>
-              <a:defRPr sz="2000"/>
+              <a:defRPr sz="1333"/>
             </a:lvl4pPr>
             <a:lvl5pPr>
-              <a:defRPr sz="2000"/>
+              <a:defRPr sz="1333"/>
             </a:lvl5pPr>
             <a:lvl6pPr>
-              <a:defRPr sz="2000"/>
+              <a:defRPr sz="1333"/>
             </a:lvl6pPr>
             <a:lvl7pPr>
-              <a:defRPr sz="2000"/>
+              <a:defRPr sz="1333"/>
             </a:lvl7pPr>
             <a:lvl8pPr>
-              <a:defRPr sz="2000"/>
+              <a:defRPr sz="1333"/>
             </a:lvl8pPr>
             <a:lvl9pPr>
-              <a:defRPr sz="2000"/>
+              <a:defRPr sz="1333"/>
             </a:lvl9pPr>
           </a:lstStyle>
           <a:p>
@@ -2184,8 +2200,8 @@
         </p:nvSpPr>
         <p:spPr>
           <a:xfrm>
-            <a:off x="457200" y="1435100"/>
-            <a:ext cx="3008313" cy="4691063"/>
+            <a:off x="429739" y="956737"/>
+            <a:ext cx="2827605" cy="3127375"/>
           </a:xfrm>
         </p:spPr>
         <p:txBody>
@@ -2193,39 +2209,39 @@
           <a:lstStyle>
             <a:lvl1pPr marL="0" indent="0">
               <a:buNone/>
-              <a:defRPr sz="1400"/>
+              <a:defRPr sz="933"/>
             </a:lvl1pPr>
-            <a:lvl2pPr marL="457200" indent="0">
-              <a:buNone/>
-              <a:defRPr sz="1200"/>
+            <a:lvl2pPr marL="304815" indent="0">
+              <a:buNone/>
+              <a:defRPr sz="800"/>
             </a:lvl2pPr>
-            <a:lvl3pPr marL="914400" indent="0">
-              <a:buNone/>
-              <a:defRPr sz="1000"/>
+            <a:lvl3pPr marL="609630" indent="0">
+              <a:buNone/>
+              <a:defRPr sz="667"/>
             </a:lvl3pPr>
-            <a:lvl4pPr marL="1371600" indent="0">
-              <a:buNone/>
-              <a:defRPr sz="900"/>
+            <a:lvl4pPr marL="914446" indent="0">
+              <a:buNone/>
+              <a:defRPr sz="600"/>
             </a:lvl4pPr>
-            <a:lvl5pPr marL="1828800" indent="0">
-              <a:buNone/>
-              <a:defRPr sz="900"/>
+            <a:lvl5pPr marL="1219261" indent="0">
+              <a:buNone/>
+              <a:defRPr sz="600"/>
             </a:lvl5pPr>
-            <a:lvl6pPr marL="2286000" indent="0">
-              <a:buNone/>
-              <a:defRPr sz="900"/>
+            <a:lvl6pPr marL="1524076" indent="0">
+              <a:buNone/>
+              <a:defRPr sz="600"/>
             </a:lvl6pPr>
-            <a:lvl7pPr marL="2743200" indent="0">
-              <a:buNone/>
-              <a:defRPr sz="900"/>
+            <a:lvl7pPr marL="1828891" indent="0">
+              <a:buNone/>
+              <a:defRPr sz="600"/>
             </a:lvl7pPr>
-            <a:lvl8pPr marL="3200400" indent="0">
-              <a:buNone/>
-              <a:defRPr sz="900"/>
+            <a:lvl8pPr marL="2133707" indent="0">
+              <a:buNone/>
+              <a:defRPr sz="600"/>
             </a:lvl8pPr>
-            <a:lvl9pPr marL="3657600" indent="0">
-              <a:buNone/>
-              <a:defRPr sz="900"/>
+            <a:lvl9pPr marL="2438522" indent="0">
+              <a:buNone/>
+              <a:defRPr sz="600"/>
             </a:lvl9pPr>
           </a:lstStyle>
           <a:p>
@@ -2254,7 +2270,7 @@
           <a:p>
             <a:fld id="{4BAFBD1D-7023-4800-B461-8C067D44DA82}" type="datetimeFigureOut">
               <a:rPr lang="en-US" smtClean="0"/>
-              <a:t>9/25/2014</a:t>
+              <a:t>9/26/2014</a:t>
             </a:fld>
             <a:endParaRPr lang="en-US"/>
           </a:p>
@@ -2344,15 +2360,15 @@
         </p:nvSpPr>
         <p:spPr>
           <a:xfrm>
-            <a:off x="1792288" y="4800600"/>
-            <a:ext cx="5486400" cy="566738"/>
+            <a:off x="1684627" y="3200403"/>
+            <a:ext cx="5156835" cy="377825"/>
           </a:xfrm>
         </p:spPr>
         <p:txBody>
           <a:bodyPr anchor="b"/>
           <a:lstStyle>
             <a:lvl1pPr algn="l">
-              <a:defRPr sz="2000" b="1"/>
+              <a:defRPr sz="1333" b="1"/>
             </a:lvl1pPr>
           </a:lstStyle>
           <a:p>
@@ -2376,8 +2392,8 @@
         </p:nvSpPr>
         <p:spPr>
           <a:xfrm>
-            <a:off x="1792288" y="612775"/>
-            <a:ext cx="5486400" cy="4114800"/>
+            <a:off x="1684627" y="408517"/>
+            <a:ext cx="5156835" cy="2743200"/>
           </a:xfrm>
         </p:spPr>
         <p:txBody>
@@ -2385,39 +2401,39 @@
           <a:lstStyle>
             <a:lvl1pPr marL="0" indent="0">
               <a:buNone/>
-              <a:defRPr sz="3200"/>
+              <a:defRPr sz="2133"/>
             </a:lvl1pPr>
-            <a:lvl2pPr marL="457200" indent="0">
-              <a:buNone/>
-              <a:defRPr sz="2800"/>
+            <a:lvl2pPr marL="304815" indent="0">
+              <a:buNone/>
+              <a:defRPr sz="1867"/>
             </a:lvl2pPr>
-            <a:lvl3pPr marL="914400" indent="0">
-              <a:buNone/>
-              <a:defRPr sz="2400"/>
+            <a:lvl3pPr marL="609630" indent="0">
+              <a:buNone/>
+              <a:defRPr sz="1600"/>
             </a:lvl3pPr>
-            <a:lvl4pPr marL="1371600" indent="0">
-              <a:buNone/>
-              <a:defRPr sz="2000"/>
+            <a:lvl4pPr marL="914446" indent="0">
+              <a:buNone/>
+              <a:defRPr sz="1333"/>
             </a:lvl4pPr>
-            <a:lvl5pPr marL="1828800" indent="0">
-              <a:buNone/>
-              <a:defRPr sz="2000"/>
+            <a:lvl5pPr marL="1219261" indent="0">
+              <a:buNone/>
+              <a:defRPr sz="1333"/>
             </a:lvl5pPr>
-            <a:lvl6pPr marL="2286000" indent="0">
-              <a:buNone/>
-              <a:defRPr sz="2000"/>
+            <a:lvl6pPr marL="1524076" indent="0">
+              <a:buNone/>
+              <a:defRPr sz="1333"/>
             </a:lvl6pPr>
-            <a:lvl7pPr marL="2743200" indent="0">
-              <a:buNone/>
-              <a:defRPr sz="2000"/>
+            <a:lvl7pPr marL="1828891" indent="0">
+              <a:buNone/>
+              <a:defRPr sz="1333"/>
             </a:lvl7pPr>
-            <a:lvl8pPr marL="3200400" indent="0">
-              <a:buNone/>
-              <a:defRPr sz="2000"/>
+            <a:lvl8pPr marL="2133707" indent="0">
+              <a:buNone/>
+              <a:defRPr sz="1333"/>
             </a:lvl8pPr>
-            <a:lvl9pPr marL="3657600" indent="0">
-              <a:buNone/>
-              <a:defRPr sz="2000"/>
+            <a:lvl9pPr marL="2438522" indent="0">
+              <a:buNone/>
+              <a:defRPr sz="1333"/>
             </a:lvl9pPr>
           </a:lstStyle>
           <a:p>
@@ -2437,8 +2453,8 @@
         </p:nvSpPr>
         <p:spPr>
           <a:xfrm>
-            <a:off x="1792288" y="5367338"/>
-            <a:ext cx="5486400" cy="804862"/>
+            <a:off x="1684627" y="3578228"/>
+            <a:ext cx="5156835" cy="536575"/>
           </a:xfrm>
         </p:spPr>
         <p:txBody>
@@ -2446,39 +2462,39 @@
           <a:lstStyle>
             <a:lvl1pPr marL="0" indent="0">
               <a:buNone/>
-              <a:defRPr sz="1400"/>
+              <a:defRPr sz="933"/>
             </a:lvl1pPr>
-            <a:lvl2pPr marL="457200" indent="0">
-              <a:buNone/>
-              <a:defRPr sz="1200"/>
+            <a:lvl2pPr marL="304815" indent="0">
+              <a:buNone/>
+              <a:defRPr sz="800"/>
             </a:lvl2pPr>
-            <a:lvl3pPr marL="914400" indent="0">
-              <a:buNone/>
-              <a:defRPr sz="1000"/>
+            <a:lvl3pPr marL="609630" indent="0">
+              <a:buNone/>
+              <a:defRPr sz="667"/>
             </a:lvl3pPr>
-            <a:lvl4pPr marL="1371600" indent="0">
-              <a:buNone/>
-              <a:defRPr sz="900"/>
+            <a:lvl4pPr marL="914446" indent="0">
+              <a:buNone/>
+              <a:defRPr sz="600"/>
             </a:lvl4pPr>
-            <a:lvl5pPr marL="1828800" indent="0">
-              <a:buNone/>
-              <a:defRPr sz="900"/>
+            <a:lvl5pPr marL="1219261" indent="0">
+              <a:buNone/>
+              <a:defRPr sz="600"/>
             </a:lvl5pPr>
-            <a:lvl6pPr marL="2286000" indent="0">
-              <a:buNone/>
-              <a:defRPr sz="900"/>
+            <a:lvl6pPr marL="1524076" indent="0">
+              <a:buNone/>
+              <a:defRPr sz="600"/>
             </a:lvl6pPr>
-            <a:lvl7pPr marL="2743200" indent="0">
-              <a:buNone/>
-              <a:defRPr sz="900"/>
+            <a:lvl7pPr marL="1828891" indent="0">
+              <a:buNone/>
+              <a:defRPr sz="600"/>
             </a:lvl7pPr>
-            <a:lvl8pPr marL="3200400" indent="0">
-              <a:buNone/>
-              <a:defRPr sz="900"/>
+            <a:lvl8pPr marL="2133707" indent="0">
+              <a:buNone/>
+              <a:defRPr sz="600"/>
             </a:lvl8pPr>
-            <a:lvl9pPr marL="3657600" indent="0">
-              <a:buNone/>
-              <a:defRPr sz="900"/>
+            <a:lvl9pPr marL="2438522" indent="0">
+              <a:buNone/>
+              <a:defRPr sz="600"/>
             </a:lvl9pPr>
           </a:lstStyle>
           <a:p>
@@ -2507,7 +2523,7 @@
           <a:p>
             <a:fld id="{4BAFBD1D-7023-4800-B461-8C067D44DA82}" type="datetimeFigureOut">
               <a:rPr lang="en-US" smtClean="0"/>
-              <a:t>9/25/2014</a:t>
+              <a:t>9/26/2014</a:t>
             </a:fld>
             <a:endParaRPr lang="en-US"/>
           </a:p>
@@ -2602,8 +2618,8 @@
         </p:nvSpPr>
         <p:spPr>
           <a:xfrm>
-            <a:off x="457200" y="274638"/>
-            <a:ext cx="8229600" cy="1143000"/>
+            <a:off x="429736" y="183092"/>
+            <a:ext cx="7735253" cy="762000"/>
           </a:xfrm>
           <a:prstGeom prst="rect">
             <a:avLst/>
@@ -2635,8 +2651,8 @@
         </p:nvSpPr>
         <p:spPr>
           <a:xfrm>
-            <a:off x="457200" y="1600200"/>
-            <a:ext cx="8229600" cy="4525963"/>
+            <a:off x="429736" y="1066803"/>
+            <a:ext cx="7735253" cy="3017309"/>
           </a:xfrm>
           <a:prstGeom prst="rect">
             <a:avLst/>
@@ -2697,8 +2713,8 @@
         </p:nvSpPr>
         <p:spPr>
           <a:xfrm>
-            <a:off x="457200" y="6356350"/>
-            <a:ext cx="2133600" cy="365125"/>
+            <a:off x="429736" y="4237570"/>
+            <a:ext cx="2005436" cy="243417"/>
           </a:xfrm>
           <a:prstGeom prst="rect">
             <a:avLst/>
@@ -2708,7 +2724,7 @@
           <a:bodyPr vert="horz" lIns="91440" tIns="45720" rIns="91440" bIns="45720" rtlCol="0" anchor="ctr"/>
           <a:lstStyle>
             <a:lvl1pPr algn="l">
-              <a:defRPr sz="1200">
+              <a:defRPr sz="800">
                 <a:solidFill>
                   <a:schemeClr val="tx1">
                     <a:tint val="75000"/>
@@ -2720,7 +2736,7 @@
           <a:p>
             <a:fld id="{4BAFBD1D-7023-4800-B461-8C067D44DA82}" type="datetimeFigureOut">
               <a:rPr lang="en-US" smtClean="0"/>
-              <a:t>9/25/2014</a:t>
+              <a:t>9/26/2014</a:t>
             </a:fld>
             <a:endParaRPr lang="en-US"/>
           </a:p>
@@ -2738,8 +2754,8 @@
         </p:nvSpPr>
         <p:spPr>
           <a:xfrm>
-            <a:off x="3124200" y="6356350"/>
-            <a:ext cx="2895600" cy="365125"/>
+            <a:off x="2936531" y="4237570"/>
+            <a:ext cx="2721663" cy="243417"/>
           </a:xfrm>
           <a:prstGeom prst="rect">
             <a:avLst/>
@@ -2749,7 +2765,7 @@
           <a:bodyPr vert="horz" lIns="91440" tIns="45720" rIns="91440" bIns="45720" rtlCol="0" anchor="ctr"/>
           <a:lstStyle>
             <a:lvl1pPr algn="ctr">
-              <a:defRPr sz="1200">
+              <a:defRPr sz="800">
                 <a:solidFill>
                   <a:schemeClr val="tx1">
                     <a:tint val="75000"/>
@@ -2775,8 +2791,8 @@
         </p:nvSpPr>
         <p:spPr>
           <a:xfrm>
-            <a:off x="6553200" y="6356350"/>
-            <a:ext cx="2133600" cy="365125"/>
+            <a:off x="6159553" y="4237570"/>
+            <a:ext cx="2005436" cy="243417"/>
           </a:xfrm>
           <a:prstGeom prst="rect">
             <a:avLst/>
@@ -2786,7 +2802,7 @@
           <a:bodyPr vert="horz" lIns="91440" tIns="45720" rIns="91440" bIns="45720" rtlCol="0" anchor="ctr"/>
           <a:lstStyle>
             <a:lvl1pPr algn="r">
-              <a:defRPr sz="1200">
+              <a:defRPr sz="800">
                 <a:solidFill>
                   <a:schemeClr val="tx1">
                     <a:tint val="75000"/>
@@ -2827,12 +2843,12 @@
   </p:sldLayoutIdLst>
   <p:txStyles>
     <p:titleStyle>
-      <a:lvl1pPr algn="ctr" defTabSz="914400" rtl="0" eaLnBrk="1" latinLnBrk="0" hangingPunct="1">
+      <a:lvl1pPr algn="ctr" defTabSz="609630" rtl="0" eaLnBrk="1" latinLnBrk="0" hangingPunct="1">
         <a:spcBef>
           <a:spcPct val="0"/>
         </a:spcBef>
         <a:buNone/>
-        <a:defRPr sz="4400" kern="1200">
+        <a:defRPr sz="2933" kern="1200">
           <a:solidFill>
             <a:schemeClr val="tx1"/>
           </a:solidFill>
@@ -2843,13 +2859,13 @@
       </a:lvl1pPr>
     </p:titleStyle>
     <p:bodyStyle>
-      <a:lvl1pPr marL="342900" indent="-342900" algn="l" defTabSz="914400" rtl="0" eaLnBrk="1" latinLnBrk="0" hangingPunct="1">
+      <a:lvl1pPr marL="228611" indent="-228611" algn="l" defTabSz="609630" rtl="0" eaLnBrk="1" latinLnBrk="0" hangingPunct="1">
         <a:spcBef>
           <a:spcPct val="20000"/>
         </a:spcBef>
         <a:buFont typeface="Arial" panose="020B0604020202020204" pitchFamily="34" charset="0"/>
         <a:buChar char="•"/>
-        <a:defRPr sz="3200" kern="1200">
+        <a:defRPr sz="2133" kern="1200">
           <a:solidFill>
             <a:schemeClr val="tx1"/>
           </a:solidFill>
@@ -2858,13 +2874,13 @@
           <a:cs typeface="+mn-cs"/>
         </a:defRPr>
       </a:lvl1pPr>
-      <a:lvl2pPr marL="742950" indent="-285750" algn="l" defTabSz="914400" rtl="0" eaLnBrk="1" latinLnBrk="0" hangingPunct="1">
+      <a:lvl2pPr marL="495325" indent="-190510" algn="l" defTabSz="609630" rtl="0" eaLnBrk="1" latinLnBrk="0" hangingPunct="1">
         <a:spcBef>
           <a:spcPct val="20000"/>
         </a:spcBef>
         <a:buFont typeface="Arial" panose="020B0604020202020204" pitchFamily="34" charset="0"/>
         <a:buChar char="–"/>
-        <a:defRPr sz="2800" kern="1200">
+        <a:defRPr sz="1867" kern="1200">
           <a:solidFill>
             <a:schemeClr val="tx1"/>
           </a:solidFill>
@@ -2873,13 +2889,13 @@
           <a:cs typeface="+mn-cs"/>
         </a:defRPr>
       </a:lvl2pPr>
-      <a:lvl3pPr marL="1143000" indent="-228600" algn="l" defTabSz="914400" rtl="0" eaLnBrk="1" latinLnBrk="0" hangingPunct="1">
+      <a:lvl3pPr marL="762038" indent="-152408" algn="l" defTabSz="609630" rtl="0" eaLnBrk="1" latinLnBrk="0" hangingPunct="1">
         <a:spcBef>
           <a:spcPct val="20000"/>
         </a:spcBef>
         <a:buFont typeface="Arial" panose="020B0604020202020204" pitchFamily="34" charset="0"/>
         <a:buChar char="•"/>
-        <a:defRPr sz="2400" kern="1200">
+        <a:defRPr sz="1600" kern="1200">
           <a:solidFill>
             <a:schemeClr val="tx1"/>
           </a:solidFill>
@@ -2888,13 +2904,13 @@
           <a:cs typeface="+mn-cs"/>
         </a:defRPr>
       </a:lvl3pPr>
-      <a:lvl4pPr marL="1600200" indent="-228600" algn="l" defTabSz="914400" rtl="0" eaLnBrk="1" latinLnBrk="0" hangingPunct="1">
+      <a:lvl4pPr marL="1066853" indent="-152408" algn="l" defTabSz="609630" rtl="0" eaLnBrk="1" latinLnBrk="0" hangingPunct="1">
         <a:spcBef>
           <a:spcPct val="20000"/>
         </a:spcBef>
         <a:buFont typeface="Arial" panose="020B0604020202020204" pitchFamily="34" charset="0"/>
         <a:buChar char="–"/>
-        <a:defRPr sz="2000" kern="1200">
+        <a:defRPr sz="1333" kern="1200">
           <a:solidFill>
             <a:schemeClr val="tx1"/>
           </a:solidFill>
@@ -2903,13 +2919,13 @@
           <a:cs typeface="+mn-cs"/>
         </a:defRPr>
       </a:lvl4pPr>
-      <a:lvl5pPr marL="2057400" indent="-228600" algn="l" defTabSz="914400" rtl="0" eaLnBrk="1" latinLnBrk="0" hangingPunct="1">
+      <a:lvl5pPr marL="1371669" indent="-152408" algn="l" defTabSz="609630" rtl="0" eaLnBrk="1" latinLnBrk="0" hangingPunct="1">
         <a:spcBef>
           <a:spcPct val="20000"/>
         </a:spcBef>
         <a:buFont typeface="Arial" panose="020B0604020202020204" pitchFamily="34" charset="0"/>
         <a:buChar char="»"/>
-        <a:defRPr sz="2000" kern="1200">
+        <a:defRPr sz="1333" kern="1200">
           <a:solidFill>
             <a:schemeClr val="tx1"/>
           </a:solidFill>
@@ -2918,13 +2934,13 @@
           <a:cs typeface="+mn-cs"/>
         </a:defRPr>
       </a:lvl5pPr>
-      <a:lvl6pPr marL="2514600" indent="-228600" algn="l" defTabSz="914400" rtl="0" eaLnBrk="1" latinLnBrk="0" hangingPunct="1">
+      <a:lvl6pPr marL="1676484" indent="-152408" algn="l" defTabSz="609630" rtl="0" eaLnBrk="1" latinLnBrk="0" hangingPunct="1">
         <a:spcBef>
           <a:spcPct val="20000"/>
         </a:spcBef>
         <a:buFont typeface="Arial" panose="020B0604020202020204" pitchFamily="34" charset="0"/>
         <a:buChar char="•"/>
-        <a:defRPr sz="2000" kern="1200">
+        <a:defRPr sz="1333" kern="1200">
           <a:solidFill>
             <a:schemeClr val="tx1"/>
           </a:solidFill>
@@ -2933,13 +2949,13 @@
           <a:cs typeface="+mn-cs"/>
         </a:defRPr>
       </a:lvl6pPr>
-      <a:lvl7pPr marL="2971800" indent="-228600" algn="l" defTabSz="914400" rtl="0" eaLnBrk="1" latinLnBrk="0" hangingPunct="1">
+      <a:lvl7pPr marL="1981299" indent="-152408" algn="l" defTabSz="609630" rtl="0" eaLnBrk="1" latinLnBrk="0" hangingPunct="1">
         <a:spcBef>
           <a:spcPct val="20000"/>
         </a:spcBef>
         <a:buFont typeface="Arial" panose="020B0604020202020204" pitchFamily="34" charset="0"/>
         <a:buChar char="•"/>
-        <a:defRPr sz="2000" kern="1200">
+        <a:defRPr sz="1333" kern="1200">
           <a:solidFill>
             <a:schemeClr val="tx1"/>
           </a:solidFill>
@@ -2948,13 +2964,13 @@
           <a:cs typeface="+mn-cs"/>
         </a:defRPr>
       </a:lvl7pPr>
-      <a:lvl8pPr marL="3429000" indent="-228600" algn="l" defTabSz="914400" rtl="0" eaLnBrk="1" latinLnBrk="0" hangingPunct="1">
+      <a:lvl8pPr marL="2286114" indent="-152408" algn="l" defTabSz="609630" rtl="0" eaLnBrk="1" latinLnBrk="0" hangingPunct="1">
         <a:spcBef>
           <a:spcPct val="20000"/>
         </a:spcBef>
         <a:buFont typeface="Arial" panose="020B0604020202020204" pitchFamily="34" charset="0"/>
         <a:buChar char="•"/>
-        <a:defRPr sz="2000" kern="1200">
+        <a:defRPr sz="1333" kern="1200">
           <a:solidFill>
             <a:schemeClr val="tx1"/>
           </a:solidFill>
@@ -2963,13 +2979,13 @@
           <a:cs typeface="+mn-cs"/>
         </a:defRPr>
       </a:lvl8pPr>
-      <a:lvl9pPr marL="3886200" indent="-228600" algn="l" defTabSz="914400" rtl="0" eaLnBrk="1" latinLnBrk="0" hangingPunct="1">
+      <a:lvl9pPr marL="2590930" indent="-152408" algn="l" defTabSz="609630" rtl="0" eaLnBrk="1" latinLnBrk="0" hangingPunct="1">
         <a:spcBef>
           <a:spcPct val="20000"/>
         </a:spcBef>
         <a:buFont typeface="Arial" panose="020B0604020202020204" pitchFamily="34" charset="0"/>
         <a:buChar char="•"/>
-        <a:defRPr sz="2000" kern="1200">
+        <a:defRPr sz="1333" kern="1200">
           <a:solidFill>
             <a:schemeClr val="tx1"/>
           </a:solidFill>
@@ -2983,8 +2999,8 @@
       <a:defPPr>
         <a:defRPr lang="en-US"/>
       </a:defPPr>
-      <a:lvl1pPr marL="0" algn="l" defTabSz="914400" rtl="0" eaLnBrk="1" latinLnBrk="0" hangingPunct="1">
-        <a:defRPr sz="1800" kern="1200">
+      <a:lvl1pPr marL="0" algn="l" defTabSz="609630" rtl="0" eaLnBrk="1" latinLnBrk="0" hangingPunct="1">
+        <a:defRPr sz="1200" kern="1200">
           <a:solidFill>
             <a:schemeClr val="tx1"/>
           </a:solidFill>
@@ -2993,8 +3009,8 @@
           <a:cs typeface="+mn-cs"/>
         </a:defRPr>
       </a:lvl1pPr>
-      <a:lvl2pPr marL="457200" algn="l" defTabSz="914400" rtl="0" eaLnBrk="1" latinLnBrk="0" hangingPunct="1">
-        <a:defRPr sz="1800" kern="1200">
+      <a:lvl2pPr marL="304815" algn="l" defTabSz="609630" rtl="0" eaLnBrk="1" latinLnBrk="0" hangingPunct="1">
+        <a:defRPr sz="1200" kern="1200">
           <a:solidFill>
             <a:schemeClr val="tx1"/>
           </a:solidFill>
@@ -3003,8 +3019,8 @@
           <a:cs typeface="+mn-cs"/>
         </a:defRPr>
       </a:lvl2pPr>
-      <a:lvl3pPr marL="914400" algn="l" defTabSz="914400" rtl="0" eaLnBrk="1" latinLnBrk="0" hangingPunct="1">
-        <a:defRPr sz="1800" kern="1200">
+      <a:lvl3pPr marL="609630" algn="l" defTabSz="609630" rtl="0" eaLnBrk="1" latinLnBrk="0" hangingPunct="1">
+        <a:defRPr sz="1200" kern="1200">
           <a:solidFill>
             <a:schemeClr val="tx1"/>
           </a:solidFill>
@@ -3013,8 +3029,8 @@
           <a:cs typeface="+mn-cs"/>
         </a:defRPr>
       </a:lvl3pPr>
-      <a:lvl4pPr marL="1371600" algn="l" defTabSz="914400" rtl="0" eaLnBrk="1" latinLnBrk="0" hangingPunct="1">
-        <a:defRPr sz="1800" kern="1200">
+      <a:lvl4pPr marL="914446" algn="l" defTabSz="609630" rtl="0" eaLnBrk="1" latinLnBrk="0" hangingPunct="1">
+        <a:defRPr sz="1200" kern="1200">
           <a:solidFill>
             <a:schemeClr val="tx1"/>
           </a:solidFill>
@@ -3023,8 +3039,8 @@
           <a:cs typeface="+mn-cs"/>
         </a:defRPr>
       </a:lvl4pPr>
-      <a:lvl5pPr marL="1828800" algn="l" defTabSz="914400" rtl="0" eaLnBrk="1" latinLnBrk="0" hangingPunct="1">
-        <a:defRPr sz="1800" kern="1200">
+      <a:lvl5pPr marL="1219261" algn="l" defTabSz="609630" rtl="0" eaLnBrk="1" latinLnBrk="0" hangingPunct="1">
+        <a:defRPr sz="1200" kern="1200">
           <a:solidFill>
             <a:schemeClr val="tx1"/>
           </a:solidFill>
@@ -3033,8 +3049,8 @@
           <a:cs typeface="+mn-cs"/>
         </a:defRPr>
       </a:lvl5pPr>
-      <a:lvl6pPr marL="2286000" algn="l" defTabSz="914400" rtl="0" eaLnBrk="1" latinLnBrk="0" hangingPunct="1">
-        <a:defRPr sz="1800" kern="1200">
+      <a:lvl6pPr marL="1524076" algn="l" defTabSz="609630" rtl="0" eaLnBrk="1" latinLnBrk="0" hangingPunct="1">
+        <a:defRPr sz="1200" kern="1200">
           <a:solidFill>
             <a:schemeClr val="tx1"/>
           </a:solidFill>
@@ -3043,8 +3059,8 @@
           <a:cs typeface="+mn-cs"/>
         </a:defRPr>
       </a:lvl6pPr>
-      <a:lvl7pPr marL="2743200" algn="l" defTabSz="914400" rtl="0" eaLnBrk="1" latinLnBrk="0" hangingPunct="1">
-        <a:defRPr sz="1800" kern="1200">
+      <a:lvl7pPr marL="1828891" algn="l" defTabSz="609630" rtl="0" eaLnBrk="1" latinLnBrk="0" hangingPunct="1">
+        <a:defRPr sz="1200" kern="1200">
           <a:solidFill>
             <a:schemeClr val="tx1"/>
           </a:solidFill>
@@ -3053,8 +3069,8 @@
           <a:cs typeface="+mn-cs"/>
         </a:defRPr>
       </a:lvl7pPr>
-      <a:lvl8pPr marL="3200400" algn="l" defTabSz="914400" rtl="0" eaLnBrk="1" latinLnBrk="0" hangingPunct="1">
-        <a:defRPr sz="1800" kern="1200">
+      <a:lvl8pPr marL="2133707" algn="l" defTabSz="609630" rtl="0" eaLnBrk="1" latinLnBrk="0" hangingPunct="1">
+        <a:defRPr sz="1200" kern="1200">
           <a:solidFill>
             <a:schemeClr val="tx1"/>
           </a:solidFill>
@@ -3063,8 +3079,8 @@
           <a:cs typeface="+mn-cs"/>
         </a:defRPr>
       </a:lvl8pPr>
-      <a:lvl9pPr marL="3657600" algn="l" defTabSz="914400" rtl="0" eaLnBrk="1" latinLnBrk="0" hangingPunct="1">
-        <a:defRPr sz="1800" kern="1200">
+      <a:lvl9pPr marL="2438522" algn="l" defTabSz="609630" rtl="0" eaLnBrk="1" latinLnBrk="0" hangingPunct="1">
+        <a:defRPr sz="1200" kern="1200">
           <a:solidFill>
             <a:schemeClr val="tx1"/>
           </a:solidFill>
@@ -3095,143 +3111,1042 @@
           <a:chExt cx="0" cy="0"/>
         </a:xfrm>
       </p:grpSpPr>
-      <p:pic>
-        <p:nvPicPr>
-          <p:cNvPr id="1026" name="Picture 2" descr="E:\ResearchDocs\MetaTracts_pvis\imagesMT2014\crop-16\histogram_10.PNG"/>
-          <p:cNvPicPr>
-            <a:picLocks noChangeAspect="1" noChangeArrowheads="1"/>
-          </p:cNvPicPr>
-          <p:nvPr/>
-        </p:nvPicPr>
-        <p:blipFill>
-          <a:blip r:embed="rId2">
-            <a:extLst>
-              <a:ext uri="{28A0092B-C50C-407E-A947-70E740481C1C}">
-                <a14:useLocalDpi xmlns:a14="http://schemas.microsoft.com/office/drawing/2010/main" val="0"/>
-              </a:ext>
-            </a:extLst>
-          </a:blip>
-          <a:srcRect/>
-          <a:stretch>
-            <a:fillRect/>
-          </a:stretch>
-        </p:blipFill>
-        <p:spPr bwMode="auto">
-          <a:xfrm>
-            <a:off x="304807" y="114145"/>
-            <a:ext cx="5302737" cy="4673713"/>
-          </a:xfrm>
-          <a:prstGeom prst="rect">
-            <a:avLst/>
-          </a:prstGeom>
-          <a:noFill/>
-          <a:extLst>
-            <a:ext uri="{909E8E84-426E-40DD-AFC4-6F175D3DCCD1}">
-              <a14:hiddenFill xmlns:a14="http://schemas.microsoft.com/office/drawing/2010/main">
-                <a:solidFill>
-                  <a:srgbClr val="FFFFFF"/>
-                </a:solidFill>
-              </a14:hiddenFill>
-            </a:ext>
-          </a:extLst>
-        </p:spPr>
-      </p:pic>
-      <p:pic>
-        <p:nvPicPr>
-          <p:cNvPr id="5" name="Picture 4"/>
-          <p:cNvPicPr>
-            <a:picLocks noChangeAspect="1"/>
-          </p:cNvPicPr>
-          <p:nvPr/>
-        </p:nvPicPr>
-        <p:blipFill>
-          <a:blip r:embed="rId3">
-            <a:extLst>
-              <a:ext uri="{28A0092B-C50C-407E-A947-70E740481C1C}">
-                <a14:useLocalDpi xmlns:a14="http://schemas.microsoft.com/office/drawing/2010/main" val="0"/>
-              </a:ext>
-            </a:extLst>
-          </a:blip>
-          <a:stretch>
-            <a:fillRect/>
-          </a:stretch>
-        </p:blipFill>
-        <p:spPr>
-          <a:xfrm>
-            <a:off x="5486400" y="914400"/>
-            <a:ext cx="3702123" cy="3420333"/>
-          </a:xfrm>
-          <a:prstGeom prst="rect">
-            <a:avLst/>
-          </a:prstGeom>
-          <a:noFill/>
-          <a:ln>
-            <a:noFill/>
-          </a:ln>
-        </p:spPr>
-      </p:pic>
       <p:grpSp>
         <p:nvGrpSpPr>
-          <p:cNvPr id="12" name="Group 11"/>
-          <p:cNvGrpSpPr/>
+          <p:cNvPr id="3" name="Group 2"/>
+          <p:cNvGrpSpPr>
+            <a:grpSpLocks noChangeAspect="1"/>
+          </p:cNvGrpSpPr>
           <p:nvPr/>
         </p:nvGrpSpPr>
         <p:grpSpPr>
           <a:xfrm>
-            <a:off x="7085974" y="457200"/>
-            <a:ext cx="502973" cy="1055596"/>
-            <a:chOff x="7085974" y="457200"/>
-            <a:chExt cx="502973" cy="1055596"/>
+            <a:off x="167322" y="76200"/>
+            <a:ext cx="8321040" cy="4455910"/>
+            <a:chOff x="304807" y="30634"/>
+            <a:chExt cx="8883716" cy="4757224"/>
           </a:xfrm>
         </p:grpSpPr>
-        <p:sp>
-          <p:nvSpPr>
-            <p:cNvPr id="6" name="Oval 5"/>
-            <p:cNvSpPr>
-              <a:spLocks/>
-            </p:cNvSpPr>
+        <p:pic>
+          <p:nvPicPr>
+            <p:cNvPr id="1026" name="Picture 2" descr="E:\ResearchDocs\MetaTracts_pvis\imagesMT2014\crop-16\histogram_10.PNG"/>
+            <p:cNvPicPr>
+              <a:picLocks noChangeAspect="1" noChangeArrowheads="1"/>
+            </p:cNvPicPr>
             <p:nvPr/>
-          </p:nvSpPr>
+          </p:nvPicPr>
+          <p:blipFill>
+            <a:blip r:embed="rId2">
+              <a:extLst>
+                <a:ext uri="{28A0092B-C50C-407E-A947-70E740481C1C}">
+                  <a14:useLocalDpi xmlns:a14="http://schemas.microsoft.com/office/drawing/2010/main" val="0"/>
+                </a:ext>
+              </a:extLst>
+            </a:blip>
+            <a:srcRect/>
+            <a:stretch>
+              <a:fillRect/>
+            </a:stretch>
+          </p:blipFill>
+          <p:spPr bwMode="auto">
+            <a:xfrm>
+              <a:off x="304807" y="114145"/>
+              <a:ext cx="5302737" cy="4673713"/>
+            </a:xfrm>
+            <a:prstGeom prst="rect">
+              <a:avLst/>
+            </a:prstGeom>
+            <a:noFill/>
+            <a:extLst>
+              <a:ext uri="{909E8E84-426E-40DD-AFC4-6F175D3DCCD1}">
+                <a14:hiddenFill xmlns:a14="http://schemas.microsoft.com/office/drawing/2010/main">
+                  <a:solidFill>
+                    <a:srgbClr val="FFFFFF"/>
+                  </a:solidFill>
+                </a14:hiddenFill>
+              </a:ext>
+            </a:extLst>
+          </p:spPr>
+        </p:pic>
+        <p:pic>
+          <p:nvPicPr>
+            <p:cNvPr id="5" name="Picture 4"/>
+            <p:cNvPicPr>
+              <a:picLocks noChangeAspect="1"/>
+            </p:cNvPicPr>
+            <p:nvPr/>
+          </p:nvPicPr>
+          <p:blipFill>
+            <a:blip r:embed="rId3">
+              <a:extLst>
+                <a:ext uri="{28A0092B-C50C-407E-A947-70E740481C1C}">
+                  <a14:useLocalDpi xmlns:a14="http://schemas.microsoft.com/office/drawing/2010/main" val="0"/>
+                </a:ext>
+              </a:extLst>
+            </a:blip>
+            <a:stretch>
+              <a:fillRect/>
+            </a:stretch>
+          </p:blipFill>
           <p:spPr>
             <a:xfrm>
-              <a:off x="7085974" y="457200"/>
-              <a:ext cx="502973" cy="502974"/>
+              <a:off x="5486400" y="914400"/>
+              <a:ext cx="3702123" cy="3420333"/>
             </a:xfrm>
-            <a:prstGeom prst="ellipse">
+            <a:prstGeom prst="rect">
               <a:avLst/>
             </a:prstGeom>
-            <a:solidFill>
-              <a:srgbClr val="0DE3E3"/>
-            </a:solidFill>
-            <a:ln w="50800">
-              <a:solidFill>
-                <a:srgbClr val="05314B"/>
-              </a:solidFill>
+            <a:noFill/>
+            <a:ln>
+              <a:noFill/>
             </a:ln>
           </p:spPr>
-          <p:style>
-            <a:lnRef idx="2">
-              <a:schemeClr val="accent1">
-                <a:shade val="50000"/>
-              </a:schemeClr>
-            </a:lnRef>
-            <a:fillRef idx="1">
-              <a:schemeClr val="accent1"/>
-            </a:fillRef>
-            <a:effectRef idx="0">
-              <a:schemeClr val="accent1"/>
-            </a:effectRef>
-            <a:fontRef idx="minor">
-              <a:schemeClr val="lt1"/>
-            </a:fontRef>
-          </p:style>
-          <p:txBody>
-            <a:bodyPr rtlCol="0" anchor="ctr"/>
-            <a:lstStyle/>
-            <a:p>
-              <a:pPr algn="ctr"/>
-              <a:r>
-                <a:rPr lang="en-US" dirty="0">
+        </p:pic>
+        <p:grpSp>
+          <p:nvGrpSpPr>
+            <p:cNvPr id="12" name="Group 11"/>
+            <p:cNvGrpSpPr/>
+            <p:nvPr/>
+          </p:nvGrpSpPr>
+          <p:grpSpPr>
+            <a:xfrm>
+              <a:off x="7085974" y="457200"/>
+              <a:ext cx="502973" cy="1055596"/>
+              <a:chOff x="7085974" y="457200"/>
+              <a:chExt cx="502973" cy="1055596"/>
+            </a:xfrm>
+          </p:grpSpPr>
+          <p:sp>
+            <p:nvSpPr>
+              <p:cNvPr id="6" name="Oval 5"/>
+              <p:cNvSpPr>
+                <a:spLocks/>
+              </p:cNvSpPr>
+              <p:nvPr/>
+            </p:nvSpPr>
+            <p:spPr>
+              <a:xfrm>
+                <a:off x="7085974" y="457200"/>
+                <a:ext cx="502973" cy="502974"/>
+              </a:xfrm>
+              <a:prstGeom prst="ellipse">
+                <a:avLst/>
+              </a:prstGeom>
+              <a:solidFill>
+                <a:srgbClr val="0DE3E3"/>
+              </a:solidFill>
+              <a:ln w="50800">
+                <a:solidFill>
+                  <a:srgbClr val="05314B"/>
+                </a:solidFill>
+              </a:ln>
+            </p:spPr>
+            <p:style>
+              <a:lnRef idx="2">
+                <a:schemeClr val="accent1">
+                  <a:shade val="50000"/>
+                </a:schemeClr>
+              </a:lnRef>
+              <a:fillRef idx="1">
+                <a:schemeClr val="accent1"/>
+              </a:fillRef>
+              <a:effectRef idx="0">
+                <a:schemeClr val="accent1"/>
+              </a:effectRef>
+              <a:fontRef idx="minor">
+                <a:schemeClr val="lt1"/>
+              </a:fontRef>
+            </p:style>
+            <p:txBody>
+              <a:bodyPr rtlCol="0" anchor="ctr"/>
+              <a:lstStyle/>
+              <a:p>
+                <a:pPr algn="ctr"/>
+                <a:r>
+                  <a:rPr lang="en-US" sz="1200" dirty="0">
+                    <a:ln w="0"/>
+                    <a:solidFill>
+                      <a:schemeClr val="tx1"/>
+                    </a:solidFill>
+                    <a:effectLst>
+                      <a:outerShdw blurRad="38100" dist="19050" dir="2700000" algn="tl" rotWithShape="0">
+                        <a:schemeClr val="dk1">
+                          <a:alpha val="40000"/>
+                        </a:schemeClr>
+                      </a:outerShdw>
+                    </a:effectLst>
+                  </a:rPr>
+                  <a:t>6</a:t>
+                </a:r>
+              </a:p>
+            </p:txBody>
+          </p:sp>
+          <p:cxnSp>
+            <p:nvCxnSpPr>
+              <p:cNvPr id="7" name="Straight Connector 6"/>
+              <p:cNvCxnSpPr>
+                <a:stCxn id="6" idx="4"/>
+              </p:cNvCxnSpPr>
+              <p:nvPr/>
+            </p:nvCxnSpPr>
+            <p:spPr>
+              <a:xfrm>
+                <a:off x="7337461" y="960174"/>
+                <a:ext cx="9253" cy="552622"/>
+              </a:xfrm>
+              <a:prstGeom prst="line">
+                <a:avLst/>
+              </a:prstGeom>
+              <a:ln w="50800">
+                <a:solidFill>
+                  <a:srgbClr val="05314B"/>
+                </a:solidFill>
+              </a:ln>
+            </p:spPr>
+            <p:style>
+              <a:lnRef idx="1">
+                <a:schemeClr val="accent1"/>
+              </a:lnRef>
+              <a:fillRef idx="0">
+                <a:schemeClr val="accent1"/>
+              </a:fillRef>
+              <a:effectRef idx="0">
+                <a:schemeClr val="accent1"/>
+              </a:effectRef>
+              <a:fontRef idx="minor">
+                <a:schemeClr val="tx1"/>
+              </a:fontRef>
+            </p:style>
+          </p:cxnSp>
+        </p:grpSp>
+        <p:grpSp>
+          <p:nvGrpSpPr>
+            <p:cNvPr id="10" name="Group 9"/>
+            <p:cNvGrpSpPr/>
+            <p:nvPr/>
+          </p:nvGrpSpPr>
+          <p:grpSpPr>
+            <a:xfrm>
+              <a:off x="3207993" y="177163"/>
+              <a:ext cx="502973" cy="731769"/>
+              <a:chOff x="3207993" y="177163"/>
+              <a:chExt cx="502973" cy="731769"/>
+            </a:xfrm>
+            <a:solidFill>
+              <a:srgbClr val="FFFFFF"/>
+            </a:solidFill>
+          </p:grpSpPr>
+          <p:sp>
+            <p:nvSpPr>
+              <p:cNvPr id="8" name="Left Brace 7"/>
+              <p:cNvSpPr/>
+              <p:nvPr/>
+            </p:nvSpPr>
+            <p:spPr>
+              <a:xfrm rot="5400000">
+                <a:off x="3368040" y="588892"/>
+                <a:ext cx="182880" cy="457200"/>
+              </a:xfrm>
+              <a:prstGeom prst="leftBrace">
+                <a:avLst/>
+              </a:prstGeom>
+              <a:grpFill/>
+              <a:ln w="25400">
+                <a:solidFill>
+                  <a:schemeClr val="tx1"/>
+                </a:solidFill>
+              </a:ln>
+            </p:spPr>
+            <p:style>
+              <a:lnRef idx="1">
+                <a:schemeClr val="accent1"/>
+              </a:lnRef>
+              <a:fillRef idx="0">
+                <a:schemeClr val="accent1"/>
+              </a:fillRef>
+              <a:effectRef idx="0">
+                <a:schemeClr val="accent1"/>
+              </a:effectRef>
+              <a:fontRef idx="minor">
+                <a:schemeClr val="tx1"/>
+              </a:fontRef>
+            </p:style>
+            <p:txBody>
+              <a:bodyPr rtlCol="0" anchor="ctr"/>
+              <a:lstStyle/>
+              <a:p>
+                <a:pPr algn="ctr"/>
+                <a:endParaRPr lang="en-US" sz="1200"/>
+              </a:p>
+            </p:txBody>
+          </p:sp>
+          <p:sp>
+            <p:nvSpPr>
+              <p:cNvPr id="11" name="Oval 10"/>
+              <p:cNvSpPr>
+                <a:spLocks/>
+              </p:cNvSpPr>
+              <p:nvPr/>
+            </p:nvSpPr>
+            <p:spPr>
+              <a:xfrm>
+                <a:off x="3207993" y="177163"/>
+                <a:ext cx="502973" cy="502974"/>
+              </a:xfrm>
+              <a:prstGeom prst="ellipse">
+                <a:avLst/>
+              </a:prstGeom>
+              <a:solidFill>
+                <a:srgbClr val="0DE3E3"/>
+              </a:solidFill>
+              <a:ln w="50800">
+                <a:solidFill>
+                  <a:srgbClr val="05314B"/>
+                </a:solidFill>
+              </a:ln>
+            </p:spPr>
+            <p:style>
+              <a:lnRef idx="2">
+                <a:schemeClr val="accent1">
+                  <a:shade val="50000"/>
+                </a:schemeClr>
+              </a:lnRef>
+              <a:fillRef idx="1">
+                <a:schemeClr val="accent1"/>
+              </a:fillRef>
+              <a:effectRef idx="0">
+                <a:schemeClr val="accent1"/>
+              </a:effectRef>
+              <a:fontRef idx="minor">
+                <a:schemeClr val="lt1"/>
+              </a:fontRef>
+            </p:style>
+            <p:txBody>
+              <a:bodyPr rtlCol="0" anchor="ctr"/>
+              <a:lstStyle/>
+              <a:p>
+                <a:pPr algn="ctr"/>
+                <a:r>
+                  <a:rPr lang="en-US" sz="1200" dirty="0">
+                    <a:ln w="0"/>
+                    <a:solidFill>
+                      <a:schemeClr val="tx1"/>
+                    </a:solidFill>
+                    <a:effectLst>
+                      <a:outerShdw blurRad="38100" dist="19050" dir="2700000" algn="tl" rotWithShape="0">
+                        <a:schemeClr val="dk1">
+                          <a:alpha val="40000"/>
+                        </a:schemeClr>
+                      </a:outerShdw>
+                    </a:effectLst>
+                  </a:rPr>
+                  <a:t>6</a:t>
+                </a:r>
+              </a:p>
+            </p:txBody>
+          </p:sp>
+        </p:grpSp>
+        <p:grpSp>
+          <p:nvGrpSpPr>
+            <p:cNvPr id="13" name="Group 12"/>
+            <p:cNvGrpSpPr/>
+            <p:nvPr/>
+          </p:nvGrpSpPr>
+          <p:grpSpPr>
+            <a:xfrm>
+              <a:off x="4114800" y="30634"/>
+              <a:ext cx="502973" cy="731769"/>
+              <a:chOff x="3207993" y="177163"/>
+              <a:chExt cx="502973" cy="731769"/>
+            </a:xfrm>
+          </p:grpSpPr>
+          <p:sp>
+            <p:nvSpPr>
+              <p:cNvPr id="14" name="Left Brace 13"/>
+              <p:cNvSpPr/>
+              <p:nvPr/>
+            </p:nvSpPr>
+            <p:spPr>
+              <a:xfrm rot="5400000">
+                <a:off x="3368040" y="588892"/>
+                <a:ext cx="182880" cy="457200"/>
+              </a:xfrm>
+              <a:prstGeom prst="leftBrace">
+                <a:avLst/>
+              </a:prstGeom>
+              <a:ln w="25400">
+                <a:solidFill>
+                  <a:schemeClr val="tx1"/>
+                </a:solidFill>
+              </a:ln>
+            </p:spPr>
+            <p:style>
+              <a:lnRef idx="1">
+                <a:schemeClr val="accent1"/>
+              </a:lnRef>
+              <a:fillRef idx="0">
+                <a:schemeClr val="accent1"/>
+              </a:fillRef>
+              <a:effectRef idx="0">
+                <a:schemeClr val="accent1"/>
+              </a:effectRef>
+              <a:fontRef idx="minor">
+                <a:schemeClr val="tx1"/>
+              </a:fontRef>
+            </p:style>
+            <p:txBody>
+              <a:bodyPr rtlCol="0" anchor="ctr"/>
+              <a:lstStyle/>
+              <a:p>
+                <a:pPr algn="ctr"/>
+                <a:endParaRPr lang="en-US" sz="1200"/>
+              </a:p>
+            </p:txBody>
+          </p:sp>
+          <p:sp>
+            <p:nvSpPr>
+              <p:cNvPr id="15" name="Oval 14"/>
+              <p:cNvSpPr>
+                <a:spLocks/>
+              </p:cNvSpPr>
+              <p:nvPr/>
+            </p:nvSpPr>
+            <p:spPr>
+              <a:xfrm>
+                <a:off x="3207993" y="177163"/>
+                <a:ext cx="502973" cy="502974"/>
+              </a:xfrm>
+              <a:prstGeom prst="ellipse">
+                <a:avLst/>
+              </a:prstGeom>
+              <a:solidFill>
+                <a:srgbClr val="86D581"/>
+              </a:solidFill>
+              <a:ln w="50800">
+                <a:solidFill>
+                  <a:srgbClr val="05314B"/>
+                </a:solidFill>
+              </a:ln>
+            </p:spPr>
+            <p:style>
+              <a:lnRef idx="2">
+                <a:schemeClr val="accent1">
+                  <a:shade val="50000"/>
+                </a:schemeClr>
+              </a:lnRef>
+              <a:fillRef idx="1">
+                <a:schemeClr val="accent1"/>
+              </a:fillRef>
+              <a:effectRef idx="0">
+                <a:schemeClr val="accent1"/>
+              </a:effectRef>
+              <a:fontRef idx="minor">
+                <a:schemeClr val="lt1"/>
+              </a:fontRef>
+            </p:style>
+            <p:txBody>
+              <a:bodyPr rtlCol="0" anchor="ctr"/>
+              <a:lstStyle/>
+              <a:p>
+                <a:pPr algn="ctr"/>
+                <a:r>
+                  <a:rPr lang="en-US" sz="1200" dirty="0">
+                    <a:ln w="0"/>
+                    <a:solidFill>
+                      <a:schemeClr val="tx1"/>
+                    </a:solidFill>
+                    <a:effectLst>
+                      <a:outerShdw blurRad="38100" dist="19050" dir="2700000" algn="tl" rotWithShape="0">
+                        <a:schemeClr val="dk1">
+                          <a:alpha val="40000"/>
+                        </a:schemeClr>
+                      </a:outerShdw>
+                    </a:effectLst>
+                  </a:rPr>
+                  <a:t>8</a:t>
+                </a:r>
+              </a:p>
+            </p:txBody>
+          </p:sp>
+        </p:grpSp>
+        <p:grpSp>
+          <p:nvGrpSpPr>
+            <p:cNvPr id="16" name="Group 15"/>
+            <p:cNvGrpSpPr/>
+            <p:nvPr/>
+          </p:nvGrpSpPr>
+          <p:grpSpPr>
+            <a:xfrm>
+              <a:off x="4628230" y="1861288"/>
+              <a:ext cx="502973" cy="731769"/>
+              <a:chOff x="3207993" y="177163"/>
+              <a:chExt cx="502973" cy="731769"/>
+            </a:xfrm>
+          </p:grpSpPr>
+          <p:sp>
+            <p:nvSpPr>
+              <p:cNvPr id="17" name="Left Brace 16"/>
+              <p:cNvSpPr/>
+              <p:nvPr/>
+            </p:nvSpPr>
+            <p:spPr>
+              <a:xfrm rot="5400000">
+                <a:off x="3368040" y="588892"/>
+                <a:ext cx="182880" cy="457200"/>
+              </a:xfrm>
+              <a:prstGeom prst="leftBrace">
+                <a:avLst/>
+              </a:prstGeom>
+              <a:ln w="25400">
+                <a:solidFill>
+                  <a:schemeClr val="tx1"/>
+                </a:solidFill>
+              </a:ln>
+            </p:spPr>
+            <p:style>
+              <a:lnRef idx="1">
+                <a:schemeClr val="accent1"/>
+              </a:lnRef>
+              <a:fillRef idx="0">
+                <a:schemeClr val="accent1"/>
+              </a:fillRef>
+              <a:effectRef idx="0">
+                <a:schemeClr val="accent1"/>
+              </a:effectRef>
+              <a:fontRef idx="minor">
+                <a:schemeClr val="tx1"/>
+              </a:fontRef>
+            </p:style>
+            <p:txBody>
+              <a:bodyPr rtlCol="0" anchor="ctr"/>
+              <a:lstStyle/>
+              <a:p>
+                <a:pPr algn="ctr"/>
+                <a:endParaRPr lang="en-US" sz="1200"/>
+              </a:p>
+            </p:txBody>
+          </p:sp>
+          <p:sp>
+            <p:nvSpPr>
+              <p:cNvPr id="18" name="Oval 17"/>
+              <p:cNvSpPr>
+                <a:spLocks/>
+              </p:cNvSpPr>
+              <p:nvPr/>
+            </p:nvSpPr>
+            <p:spPr>
+              <a:xfrm>
+                <a:off x="3207993" y="177163"/>
+                <a:ext cx="502973" cy="502974"/>
+              </a:xfrm>
+              <a:prstGeom prst="ellipse">
+                <a:avLst/>
+              </a:prstGeom>
+              <a:solidFill>
+                <a:srgbClr val="FFFFBC"/>
+              </a:solidFill>
+              <a:ln w="50800">
+                <a:solidFill>
+                  <a:srgbClr val="05314B"/>
+                </a:solidFill>
+              </a:ln>
+            </p:spPr>
+            <p:style>
+              <a:lnRef idx="2">
+                <a:schemeClr val="accent1">
+                  <a:shade val="50000"/>
+                </a:schemeClr>
+              </a:lnRef>
+              <a:fillRef idx="1">
+                <a:schemeClr val="accent1"/>
+              </a:fillRef>
+              <a:effectRef idx="0">
+                <a:schemeClr val="accent1"/>
+              </a:effectRef>
+              <a:fontRef idx="minor">
+                <a:schemeClr val="lt1"/>
+              </a:fontRef>
+            </p:style>
+            <p:txBody>
+              <a:bodyPr rtlCol="0" anchor="ctr"/>
+              <a:lstStyle/>
+              <a:p>
+                <a:pPr algn="ctr"/>
+                <a:r>
+                  <a:rPr lang="en-US" sz="1200" dirty="0">
+                    <a:ln w="0"/>
+                    <a:solidFill>
+                      <a:schemeClr val="tx1"/>
+                    </a:solidFill>
+                    <a:effectLst>
+                      <a:outerShdw blurRad="38100" dist="19050" dir="2700000" algn="tl" rotWithShape="0">
+                        <a:schemeClr val="dk1">
+                          <a:alpha val="40000"/>
+                        </a:schemeClr>
+                      </a:outerShdw>
+                    </a:effectLst>
+                  </a:rPr>
+                  <a:t>9</a:t>
+                </a:r>
+              </a:p>
+            </p:txBody>
+          </p:sp>
+        </p:grpSp>
+        <p:grpSp>
+          <p:nvGrpSpPr>
+            <p:cNvPr id="19" name="Group 18"/>
+            <p:cNvGrpSpPr/>
+            <p:nvPr/>
+          </p:nvGrpSpPr>
+          <p:grpSpPr>
+            <a:xfrm>
+              <a:off x="5104571" y="1063806"/>
+              <a:ext cx="502973" cy="731769"/>
+              <a:chOff x="3207993" y="177163"/>
+              <a:chExt cx="502973" cy="731769"/>
+            </a:xfrm>
+          </p:grpSpPr>
+          <p:sp>
+            <p:nvSpPr>
+              <p:cNvPr id="20" name="Left Brace 19"/>
+              <p:cNvSpPr/>
+              <p:nvPr/>
+            </p:nvSpPr>
+            <p:spPr>
+              <a:xfrm rot="5400000">
+                <a:off x="3368040" y="588892"/>
+                <a:ext cx="182880" cy="457200"/>
+              </a:xfrm>
+              <a:prstGeom prst="leftBrace">
+                <a:avLst/>
+              </a:prstGeom>
+              <a:ln w="25400">
+                <a:solidFill>
+                  <a:schemeClr val="tx1"/>
+                </a:solidFill>
+              </a:ln>
+            </p:spPr>
+            <p:style>
+              <a:lnRef idx="1">
+                <a:schemeClr val="accent1"/>
+              </a:lnRef>
+              <a:fillRef idx="0">
+                <a:schemeClr val="accent1"/>
+              </a:fillRef>
+              <a:effectRef idx="0">
+                <a:schemeClr val="accent1"/>
+              </a:effectRef>
+              <a:fontRef idx="minor">
+                <a:schemeClr val="tx1"/>
+              </a:fontRef>
+            </p:style>
+            <p:txBody>
+              <a:bodyPr rtlCol="0" anchor="ctr"/>
+              <a:lstStyle/>
+              <a:p>
+                <a:pPr algn="ctr"/>
+                <a:endParaRPr lang="en-US" sz="1200"/>
+              </a:p>
+            </p:txBody>
+          </p:sp>
+          <p:sp>
+            <p:nvSpPr>
+              <p:cNvPr id="21" name="Oval 20"/>
+              <p:cNvSpPr>
+                <a:spLocks/>
+              </p:cNvSpPr>
+              <p:nvPr/>
+            </p:nvSpPr>
+            <p:spPr>
+              <a:xfrm>
+                <a:off x="3207993" y="177163"/>
+                <a:ext cx="502973" cy="502974"/>
+              </a:xfrm>
+              <a:prstGeom prst="ellipse">
+                <a:avLst/>
+              </a:prstGeom>
+              <a:solidFill>
+                <a:srgbClr val="0538B1"/>
+              </a:solidFill>
+              <a:ln w="50800">
+                <a:solidFill>
+                  <a:srgbClr val="05314B"/>
+                </a:solidFill>
+              </a:ln>
+            </p:spPr>
+            <p:style>
+              <a:lnRef idx="2">
+                <a:schemeClr val="accent1">
+                  <a:shade val="50000"/>
+                </a:schemeClr>
+              </a:lnRef>
+              <a:fillRef idx="1">
+                <a:schemeClr val="accent1"/>
+              </a:fillRef>
+              <a:effectRef idx="0">
+                <a:schemeClr val="accent1"/>
+              </a:effectRef>
+              <a:fontRef idx="minor">
+                <a:schemeClr val="lt1"/>
+              </a:fontRef>
+            </p:style>
+            <p:txBody>
+              <a:bodyPr rtlCol="0" anchor="ctr"/>
+              <a:lstStyle/>
+              <a:p>
+                <a:pPr algn="ctr"/>
+                <a:r>
+                  <a:rPr lang="en-US" sz="800" dirty="0">
+                    <a:ln w="0"/>
+                    <a:solidFill>
+                      <a:schemeClr val="bg1"/>
+                    </a:solidFill>
+                    <a:effectLst>
+                      <a:outerShdw blurRad="38100" dist="19050" dir="2700000" algn="tl" rotWithShape="0">
+                        <a:schemeClr val="dk1">
+                          <a:alpha val="40000"/>
+                        </a:schemeClr>
+                      </a:outerShdw>
+                    </a:effectLst>
+                  </a:rPr>
+                  <a:t>10</a:t>
+                </a:r>
+                <a:endParaRPr lang="en-US" sz="800" dirty="0">
+                  <a:ln w="0"/>
+                  <a:solidFill>
+                    <a:schemeClr val="bg1"/>
+                  </a:solidFill>
+                  <a:effectLst>
+                    <a:outerShdw blurRad="38100" dist="19050" dir="2700000" algn="tl" rotWithShape="0">
+                      <a:schemeClr val="dk1">
+                        <a:alpha val="40000"/>
+                      </a:schemeClr>
+                    </a:outerShdw>
+                  </a:effectLst>
+                </a:endParaRPr>
+              </a:p>
+            </p:txBody>
+          </p:sp>
+        </p:grpSp>
+        <p:grpSp>
+          <p:nvGrpSpPr>
+            <p:cNvPr id="22" name="Group 21"/>
+            <p:cNvGrpSpPr/>
+            <p:nvPr/>
+          </p:nvGrpSpPr>
+          <p:grpSpPr>
+            <a:xfrm>
+              <a:off x="914400" y="1358374"/>
+              <a:ext cx="502973" cy="731769"/>
+              <a:chOff x="3207993" y="177163"/>
+              <a:chExt cx="502973" cy="731769"/>
+            </a:xfrm>
+            <a:solidFill>
+              <a:srgbClr val="D5B0D5"/>
+            </a:solidFill>
+          </p:grpSpPr>
+          <p:sp>
+            <p:nvSpPr>
+              <p:cNvPr id="23" name="Left Brace 22"/>
+              <p:cNvSpPr/>
+              <p:nvPr/>
+            </p:nvSpPr>
+            <p:spPr>
+              <a:xfrm rot="5400000">
+                <a:off x="3368040" y="588892"/>
+                <a:ext cx="182880" cy="457200"/>
+              </a:xfrm>
+              <a:prstGeom prst="leftBrace">
+                <a:avLst/>
+              </a:prstGeom>
+              <a:solidFill>
+                <a:schemeClr val="bg1"/>
+              </a:solidFill>
+              <a:ln w="25400">
+                <a:solidFill>
+                  <a:schemeClr val="tx1"/>
+                </a:solidFill>
+              </a:ln>
+            </p:spPr>
+            <p:style>
+              <a:lnRef idx="1">
+                <a:schemeClr val="accent1"/>
+              </a:lnRef>
+              <a:fillRef idx="0">
+                <a:schemeClr val="accent1"/>
+              </a:fillRef>
+              <a:effectRef idx="0">
+                <a:schemeClr val="accent1"/>
+              </a:effectRef>
+              <a:fontRef idx="minor">
+                <a:schemeClr val="tx1"/>
+              </a:fontRef>
+            </p:style>
+            <p:txBody>
+              <a:bodyPr rtlCol="0" anchor="ctr"/>
+              <a:lstStyle/>
+              <a:p>
+                <a:pPr algn="ctr"/>
+                <a:endParaRPr lang="en-US" sz="1200"/>
+              </a:p>
+            </p:txBody>
+          </p:sp>
+          <p:sp>
+            <p:nvSpPr>
+              <p:cNvPr id="24" name="Oval 23"/>
+              <p:cNvSpPr>
+                <a:spLocks/>
+              </p:cNvSpPr>
+              <p:nvPr/>
+            </p:nvSpPr>
+            <p:spPr>
+              <a:xfrm>
+                <a:off x="3207993" y="177163"/>
+                <a:ext cx="502973" cy="502974"/>
+              </a:xfrm>
+              <a:prstGeom prst="ellipse">
+                <a:avLst/>
+              </a:prstGeom>
+              <a:grpFill/>
+              <a:ln w="50800">
+                <a:solidFill>
+                  <a:srgbClr val="05314B"/>
+                </a:solidFill>
+              </a:ln>
+            </p:spPr>
+            <p:style>
+              <a:lnRef idx="2">
+                <a:schemeClr val="accent1">
+                  <a:shade val="50000"/>
+                </a:schemeClr>
+              </a:lnRef>
+              <a:fillRef idx="1">
+                <a:schemeClr val="accent1"/>
+              </a:fillRef>
+              <a:effectRef idx="0">
+                <a:schemeClr val="accent1"/>
+              </a:effectRef>
+              <a:fontRef idx="minor">
+                <a:schemeClr val="lt1"/>
+              </a:fontRef>
+            </p:style>
+            <p:txBody>
+              <a:bodyPr rtlCol="0" anchor="ctr"/>
+              <a:lstStyle/>
+              <a:p>
+                <a:pPr algn="ctr"/>
+                <a:r>
+                  <a:rPr lang="en-US" sz="1200" dirty="0">
+                    <a:ln w="0"/>
+                    <a:solidFill>
+                      <a:schemeClr val="tx1"/>
+                    </a:solidFill>
+                    <a:effectLst>
+                      <a:outerShdw blurRad="38100" dist="19050" dir="2700000" algn="tl" rotWithShape="0">
+                        <a:schemeClr val="dk1">
+                          <a:alpha val="40000"/>
+                        </a:schemeClr>
+                      </a:outerShdw>
+                    </a:effectLst>
+                  </a:rPr>
+                  <a:t>1</a:t>
+                </a:r>
+              </a:p>
+            </p:txBody>
+          </p:sp>
+        </p:grpSp>
+        <p:grpSp>
+          <p:nvGrpSpPr>
+            <p:cNvPr id="26" name="Group 25"/>
+            <p:cNvGrpSpPr/>
+            <p:nvPr/>
+          </p:nvGrpSpPr>
+          <p:grpSpPr>
+            <a:xfrm>
+              <a:off x="6019800" y="3048000"/>
+              <a:ext cx="502973" cy="1055596"/>
+              <a:chOff x="7085974" y="-95422"/>
+              <a:chExt cx="502973" cy="1055596"/>
+            </a:xfrm>
+          </p:grpSpPr>
+          <p:sp>
+            <p:nvSpPr>
+              <p:cNvPr id="27" name="Oval 26"/>
+              <p:cNvSpPr>
+                <a:spLocks/>
+              </p:cNvSpPr>
+              <p:nvPr/>
+            </p:nvSpPr>
+            <p:spPr>
+              <a:xfrm>
+                <a:off x="7085974" y="457200"/>
+                <a:ext cx="502973" cy="502974"/>
+              </a:xfrm>
+              <a:prstGeom prst="ellipse">
+                <a:avLst/>
+              </a:prstGeom>
+              <a:solidFill>
+                <a:srgbClr val="0538B1"/>
+              </a:solidFill>
+              <a:ln w="50800">
+                <a:solidFill>
+                  <a:srgbClr val="05314B"/>
+                </a:solidFill>
+              </a:ln>
+            </p:spPr>
+            <p:style>
+              <a:lnRef idx="2">
+                <a:schemeClr val="accent1">
+                  <a:shade val="50000"/>
+                </a:schemeClr>
+              </a:lnRef>
+              <a:fillRef idx="1">
+                <a:schemeClr val="accent1"/>
+              </a:fillRef>
+              <a:effectRef idx="0">
+                <a:schemeClr val="accent1"/>
+              </a:effectRef>
+              <a:fontRef idx="minor">
+                <a:schemeClr val="lt1"/>
+              </a:fontRef>
+            </p:style>
+            <p:txBody>
+              <a:bodyPr rtlCol="0" anchor="ctr"/>
+              <a:lstStyle/>
+              <a:p>
+                <a:pPr algn="ctr"/>
+                <a:r>
+                  <a:rPr lang="en-US" sz="800" dirty="0">
+                    <a:ln w="0"/>
+                    <a:solidFill>
+                      <a:schemeClr val="bg1"/>
+                    </a:solidFill>
+                    <a:effectLst>
+                      <a:outerShdw blurRad="38100" dist="19050" dir="2700000" algn="tl" rotWithShape="0">
+                        <a:schemeClr val="dk1">
+                          <a:alpha val="40000"/>
+                        </a:schemeClr>
+                      </a:outerShdw>
+                    </a:effectLst>
+                  </a:rPr>
+                  <a:t>10</a:t>
+                </a:r>
+              </a:p>
+            </p:txBody>
+          </p:sp>
+          <p:cxnSp>
+            <p:nvCxnSpPr>
+              <p:cNvPr id="28" name="Straight Connector 27"/>
+              <p:cNvCxnSpPr/>
+              <p:nvPr/>
+            </p:nvCxnSpPr>
+            <p:spPr>
+              <a:xfrm>
+                <a:off x="7328208" y="-95422"/>
+                <a:ext cx="9253" cy="552622"/>
+              </a:xfrm>
+              <a:prstGeom prst="line">
+                <a:avLst/>
+              </a:prstGeom>
+              <a:ln w="50800">
+                <a:solidFill>
+                  <a:srgbClr val="05314B"/>
+                </a:solidFill>
+              </a:ln>
+            </p:spPr>
+            <p:style>
+              <a:lnRef idx="1">
+                <a:schemeClr val="accent1"/>
+              </a:lnRef>
+              <a:fillRef idx="0">
+                <a:schemeClr val="accent1"/>
+              </a:fillRef>
+              <a:effectRef idx="0">
+                <a:schemeClr val="accent1"/>
+              </a:effectRef>
+              <a:fontRef idx="minor">
+                <a:schemeClr val="tx1"/>
+              </a:fontRef>
+            </p:style>
+          </p:cxnSp>
+        </p:grpSp>
+        <p:grpSp>
+          <p:nvGrpSpPr>
+            <p:cNvPr id="29" name="Group 28"/>
+            <p:cNvGrpSpPr/>
+            <p:nvPr/>
+          </p:nvGrpSpPr>
+          <p:grpSpPr>
+            <a:xfrm>
+              <a:off x="6834487" y="3786678"/>
+              <a:ext cx="502973" cy="779285"/>
+              <a:chOff x="7085974" y="180889"/>
+              <a:chExt cx="502973" cy="779285"/>
+            </a:xfrm>
+          </p:grpSpPr>
+          <p:sp>
+            <p:nvSpPr>
+              <p:cNvPr id="30" name="Oval 29"/>
+              <p:cNvSpPr>
+                <a:spLocks/>
+              </p:cNvSpPr>
+              <p:nvPr/>
+            </p:nvSpPr>
+            <p:spPr>
+              <a:xfrm>
+                <a:off x="7085974" y="457200"/>
+                <a:ext cx="502973" cy="502974"/>
+              </a:xfrm>
+              <a:prstGeom prst="ellipse">
+                <a:avLst/>
+              </a:prstGeom>
+              <a:solidFill>
+                <a:srgbClr val="D5B0D5"/>
+              </a:solidFill>
+              <a:ln w="50800">
+                <a:solidFill>
+                  <a:srgbClr val="05314B"/>
+                </a:solidFill>
+              </a:ln>
+            </p:spPr>
+            <p:style>
+              <a:lnRef idx="2">
+                <a:schemeClr val="accent1">
+                  <a:shade val="50000"/>
+                </a:schemeClr>
+              </a:lnRef>
+              <a:fillRef idx="1">
+                <a:schemeClr val="accent1"/>
+              </a:fillRef>
+              <a:effectRef idx="0">
+                <a:schemeClr val="accent1"/>
+              </a:effectRef>
+              <a:fontRef idx="minor">
+                <a:schemeClr val="lt1"/>
+              </a:fontRef>
+            </p:style>
+            <p:txBody>
+              <a:bodyPr rtlCol="0" anchor="ctr"/>
+              <a:lstStyle/>
+              <a:p>
+                <a:pPr algn="ctr"/>
+                <a:r>
+                  <a:rPr lang="en-US" sz="1067" dirty="0">
+                    <a:ln w="0"/>
+                    <a:solidFill>
+                      <a:schemeClr val="tx1"/>
+                    </a:solidFill>
+                    <a:effectLst>
+                      <a:outerShdw blurRad="38100" dist="19050" dir="2700000" algn="tl" rotWithShape="0">
+                        <a:schemeClr val="dk1">
+                          <a:alpha val="40000"/>
+                        </a:schemeClr>
+                      </a:outerShdw>
+                    </a:effectLst>
+                  </a:rPr>
+                  <a:t>1</a:t>
+                </a:r>
+                <a:endParaRPr lang="en-US" sz="800" dirty="0">
                   <a:ln w="0"/>
                   <a:solidFill>
                     <a:schemeClr val="tx1"/>
@@ -3243,155 +4158,123 @@
                       </a:schemeClr>
                     </a:outerShdw>
                   </a:effectLst>
-                </a:rPr>
-                <a:t>6</a:t>
-              </a:r>
-            </a:p>
-          </p:txBody>
-        </p:sp>
-        <p:cxnSp>
-          <p:nvCxnSpPr>
-            <p:cNvPr id="7" name="Straight Connector 6"/>
-            <p:cNvCxnSpPr>
-              <a:stCxn id="6" idx="4"/>
-            </p:cNvCxnSpPr>
+                </a:endParaRPr>
+              </a:p>
+            </p:txBody>
+          </p:sp>
+          <p:cxnSp>
+            <p:nvCxnSpPr>
+              <p:cNvPr id="31" name="Straight Connector 30"/>
+              <p:cNvCxnSpPr/>
+              <p:nvPr/>
+            </p:nvCxnSpPr>
+            <p:spPr>
+              <a:xfrm>
+                <a:off x="7337461" y="180889"/>
+                <a:ext cx="0" cy="276311"/>
+              </a:xfrm>
+              <a:prstGeom prst="line">
+                <a:avLst/>
+              </a:prstGeom>
+              <a:ln w="50800">
+                <a:solidFill>
+                  <a:srgbClr val="05314B"/>
+                </a:solidFill>
+              </a:ln>
+            </p:spPr>
+            <p:style>
+              <a:lnRef idx="1">
+                <a:schemeClr val="accent1"/>
+              </a:lnRef>
+              <a:fillRef idx="0">
+                <a:schemeClr val="accent1"/>
+              </a:fillRef>
+              <a:effectRef idx="0">
+                <a:schemeClr val="accent1"/>
+              </a:effectRef>
+              <a:fontRef idx="minor">
+                <a:schemeClr val="tx1"/>
+              </a:fontRef>
+            </p:style>
+          </p:cxnSp>
+        </p:grpSp>
+        <p:grpSp>
+          <p:nvGrpSpPr>
+            <p:cNvPr id="33" name="Group 32"/>
+            <p:cNvGrpSpPr/>
             <p:nvPr/>
-          </p:nvCxnSpPr>
-          <p:spPr>
+          </p:nvGrpSpPr>
+          <p:grpSpPr>
             <a:xfrm>
-              <a:off x="7337461" y="960174"/>
-              <a:ext cx="9253" cy="552622"/>
+              <a:off x="7460334" y="3048000"/>
+              <a:ext cx="502973" cy="1029233"/>
+              <a:chOff x="7085974" y="-69059"/>
+              <a:chExt cx="502973" cy="1029233"/>
             </a:xfrm>
-            <a:prstGeom prst="line">
-              <a:avLst/>
-            </a:prstGeom>
-            <a:ln w="50800">
+          </p:grpSpPr>
+          <p:sp>
+            <p:nvSpPr>
+              <p:cNvPr id="34" name="Oval 33"/>
+              <p:cNvSpPr>
+                <a:spLocks/>
+              </p:cNvSpPr>
+              <p:nvPr/>
+            </p:nvSpPr>
+            <p:spPr>
+              <a:xfrm>
+                <a:off x="7085974" y="457200"/>
+                <a:ext cx="502973" cy="502974"/>
+              </a:xfrm>
+              <a:prstGeom prst="ellipse">
+                <a:avLst/>
+              </a:prstGeom>
               <a:solidFill>
-                <a:srgbClr val="05314B"/>
+                <a:srgbClr val="86D581"/>
               </a:solidFill>
-            </a:ln>
-          </p:spPr>
-          <p:style>
-            <a:lnRef idx="1">
-              <a:schemeClr val="accent1"/>
-            </a:lnRef>
-            <a:fillRef idx="0">
-              <a:schemeClr val="accent1"/>
-            </a:fillRef>
-            <a:effectRef idx="0">
-              <a:schemeClr val="accent1"/>
-            </a:effectRef>
-            <a:fontRef idx="minor">
-              <a:schemeClr val="tx1"/>
-            </a:fontRef>
-          </p:style>
-        </p:cxnSp>
-      </p:grpSp>
-      <p:grpSp>
-        <p:nvGrpSpPr>
-          <p:cNvPr id="10" name="Group 9"/>
-          <p:cNvGrpSpPr/>
-          <p:nvPr/>
-        </p:nvGrpSpPr>
-        <p:grpSpPr>
-          <a:xfrm>
-            <a:off x="3207993" y="177163"/>
-            <a:ext cx="502973" cy="731769"/>
-            <a:chOff x="3207993" y="177163"/>
-            <a:chExt cx="502973" cy="731769"/>
-          </a:xfrm>
-        </p:grpSpPr>
-        <p:sp>
-          <p:nvSpPr>
-            <p:cNvPr id="8" name="Left Brace 7"/>
-            <p:cNvSpPr/>
-            <p:nvPr/>
-          </p:nvSpPr>
-          <p:spPr>
-            <a:xfrm rot="5400000">
-              <a:off x="3368040" y="588892"/>
-              <a:ext cx="182880" cy="457200"/>
-            </a:xfrm>
-            <a:prstGeom prst="leftBrace">
-              <a:avLst/>
-            </a:prstGeom>
-            <a:ln w="25400">
-              <a:solidFill>
-                <a:schemeClr val="tx1"/>
-              </a:solidFill>
-            </a:ln>
-          </p:spPr>
-          <p:style>
-            <a:lnRef idx="1">
-              <a:schemeClr val="accent1"/>
-            </a:lnRef>
-            <a:fillRef idx="0">
-              <a:schemeClr val="accent1"/>
-            </a:fillRef>
-            <a:effectRef idx="0">
-              <a:schemeClr val="accent1"/>
-            </a:effectRef>
-            <a:fontRef idx="minor">
-              <a:schemeClr val="tx1"/>
-            </a:fontRef>
-          </p:style>
-          <p:txBody>
-            <a:bodyPr rtlCol="0" anchor="ctr"/>
-            <a:lstStyle/>
-            <a:p>
-              <a:pPr algn="ctr"/>
-              <a:endParaRPr lang="en-US"/>
-            </a:p>
-          </p:txBody>
-        </p:sp>
-        <p:sp>
-          <p:nvSpPr>
-            <p:cNvPr id="11" name="Oval 10"/>
-            <p:cNvSpPr>
-              <a:spLocks/>
-            </p:cNvSpPr>
-            <p:nvPr/>
-          </p:nvSpPr>
-          <p:spPr>
-            <a:xfrm>
-              <a:off x="3207993" y="177163"/>
-              <a:ext cx="502973" cy="502974"/>
-            </a:xfrm>
-            <a:prstGeom prst="ellipse">
-              <a:avLst/>
-            </a:prstGeom>
-            <a:solidFill>
-              <a:srgbClr val="0DE3E3"/>
-            </a:solidFill>
-            <a:ln w="50800">
-              <a:solidFill>
-                <a:srgbClr val="05314B"/>
-              </a:solidFill>
-            </a:ln>
-          </p:spPr>
-          <p:style>
-            <a:lnRef idx="2">
-              <a:schemeClr val="accent1">
-                <a:shade val="50000"/>
-              </a:schemeClr>
-            </a:lnRef>
-            <a:fillRef idx="1">
-              <a:schemeClr val="accent1"/>
-            </a:fillRef>
-            <a:effectRef idx="0">
-              <a:schemeClr val="accent1"/>
-            </a:effectRef>
-            <a:fontRef idx="minor">
-              <a:schemeClr val="lt1"/>
-            </a:fontRef>
-          </p:style>
-          <p:txBody>
-            <a:bodyPr rtlCol="0" anchor="ctr"/>
-            <a:lstStyle/>
-            <a:p>
-              <a:pPr algn="ctr"/>
-              <a:r>
-                <a:rPr lang="en-US" dirty="0">
+              <a:ln w="50800">
+                <a:solidFill>
+                  <a:srgbClr val="05314B"/>
+                </a:solidFill>
+              </a:ln>
+            </p:spPr>
+            <p:style>
+              <a:lnRef idx="2">
+                <a:schemeClr val="accent1">
+                  <a:shade val="50000"/>
+                </a:schemeClr>
+              </a:lnRef>
+              <a:fillRef idx="1">
+                <a:schemeClr val="accent1"/>
+              </a:fillRef>
+              <a:effectRef idx="0">
+                <a:schemeClr val="accent1"/>
+              </a:effectRef>
+              <a:fontRef idx="minor">
+                <a:schemeClr val="lt1"/>
+              </a:fontRef>
+            </p:style>
+            <p:txBody>
+              <a:bodyPr rtlCol="0" anchor="ctr"/>
+              <a:lstStyle/>
+              <a:p>
+                <a:pPr algn="ctr"/>
+                <a:r>
+                  <a:rPr lang="en-US" sz="1067" dirty="0">
+                    <a:ln w="0"/>
+                    <a:solidFill>
+                      <a:schemeClr val="tx1"/>
+                    </a:solidFill>
+                    <a:effectLst>
+                      <a:outerShdw blurRad="38100" dist="19050" dir="2700000" algn="tl" rotWithShape="0">
+                        <a:schemeClr val="dk1">
+                          <a:alpha val="40000"/>
+                        </a:schemeClr>
+                      </a:outerShdw>
+                    </a:effectLst>
+                  </a:rPr>
+                  <a:t>8</a:t>
+                </a:r>
+                <a:endParaRPr lang="en-US" sz="800" dirty="0">
                   <a:ln w="0"/>
                   <a:solidFill>
                     <a:schemeClr val="tx1"/>
@@ -3403,118 +4286,123 @@
                       </a:schemeClr>
                     </a:outerShdw>
                   </a:effectLst>
-                </a:rPr>
-                <a:t>6</a:t>
-              </a:r>
-            </a:p>
-          </p:txBody>
-        </p:sp>
-      </p:grpSp>
-      <p:grpSp>
-        <p:nvGrpSpPr>
-          <p:cNvPr id="13" name="Group 12"/>
-          <p:cNvGrpSpPr/>
-          <p:nvPr/>
-        </p:nvGrpSpPr>
-        <p:grpSpPr>
-          <a:xfrm>
-            <a:off x="4114800" y="30634"/>
-            <a:ext cx="502973" cy="731769"/>
-            <a:chOff x="3207993" y="177163"/>
-            <a:chExt cx="502973" cy="731769"/>
-          </a:xfrm>
-        </p:grpSpPr>
-        <p:sp>
-          <p:nvSpPr>
-            <p:cNvPr id="14" name="Left Brace 13"/>
-            <p:cNvSpPr/>
+                </a:endParaRPr>
+              </a:p>
+            </p:txBody>
+          </p:sp>
+          <p:cxnSp>
+            <p:nvCxnSpPr>
+              <p:cNvPr id="35" name="Straight Connector 34"/>
+              <p:cNvCxnSpPr/>
+              <p:nvPr/>
+            </p:nvCxnSpPr>
+            <p:spPr>
+              <a:xfrm>
+                <a:off x="7337461" y="-69059"/>
+                <a:ext cx="0" cy="526259"/>
+              </a:xfrm>
+              <a:prstGeom prst="line">
+                <a:avLst/>
+              </a:prstGeom>
+              <a:ln w="50800">
+                <a:solidFill>
+                  <a:srgbClr val="05314B"/>
+                </a:solidFill>
+              </a:ln>
+            </p:spPr>
+            <p:style>
+              <a:lnRef idx="1">
+                <a:schemeClr val="accent1"/>
+              </a:lnRef>
+              <a:fillRef idx="0">
+                <a:schemeClr val="accent1"/>
+              </a:fillRef>
+              <a:effectRef idx="0">
+                <a:schemeClr val="accent1"/>
+              </a:effectRef>
+              <a:fontRef idx="minor">
+                <a:schemeClr val="tx1"/>
+              </a:fontRef>
+            </p:style>
+          </p:cxnSp>
+        </p:grpSp>
+        <p:grpSp>
+          <p:nvGrpSpPr>
+            <p:cNvPr id="37" name="Group 36"/>
+            <p:cNvGrpSpPr/>
             <p:nvPr/>
-          </p:nvSpPr>
-          <p:spPr>
-            <a:xfrm rot="5400000">
-              <a:off x="3368040" y="588892"/>
-              <a:ext cx="182880" cy="457200"/>
+          </p:nvGrpSpPr>
+          <p:grpSpPr>
+            <a:xfrm>
+              <a:off x="8229600" y="2721135"/>
+              <a:ext cx="502973" cy="1029233"/>
+              <a:chOff x="7085974" y="-69059"/>
+              <a:chExt cx="502973" cy="1029233"/>
             </a:xfrm>
-            <a:prstGeom prst="leftBrace">
-              <a:avLst/>
-            </a:prstGeom>
-            <a:ln w="25400">
+          </p:grpSpPr>
+          <p:sp>
+            <p:nvSpPr>
+              <p:cNvPr id="38" name="Oval 37"/>
+              <p:cNvSpPr>
+                <a:spLocks/>
+              </p:cNvSpPr>
+              <p:nvPr/>
+            </p:nvSpPr>
+            <p:spPr>
+              <a:xfrm>
+                <a:off x="7085974" y="457200"/>
+                <a:ext cx="502973" cy="502974"/>
+              </a:xfrm>
+              <a:prstGeom prst="ellipse">
+                <a:avLst/>
+              </a:prstGeom>
               <a:solidFill>
-                <a:schemeClr val="tx1"/>
+                <a:srgbClr val="FFFFBC"/>
               </a:solidFill>
-            </a:ln>
-          </p:spPr>
-          <p:style>
-            <a:lnRef idx="1">
-              <a:schemeClr val="accent1"/>
-            </a:lnRef>
-            <a:fillRef idx="0">
-              <a:schemeClr val="accent1"/>
-            </a:fillRef>
-            <a:effectRef idx="0">
-              <a:schemeClr val="accent1"/>
-            </a:effectRef>
-            <a:fontRef idx="minor">
-              <a:schemeClr val="tx1"/>
-            </a:fontRef>
-          </p:style>
-          <p:txBody>
-            <a:bodyPr rtlCol="0" anchor="ctr"/>
-            <a:lstStyle/>
-            <a:p>
-              <a:pPr algn="ctr"/>
-              <a:endParaRPr lang="en-US"/>
-            </a:p>
-          </p:txBody>
-        </p:sp>
-        <p:sp>
-          <p:nvSpPr>
-            <p:cNvPr id="15" name="Oval 14"/>
-            <p:cNvSpPr>
-              <a:spLocks/>
-            </p:cNvSpPr>
-            <p:nvPr/>
-          </p:nvSpPr>
-          <p:spPr>
-            <a:xfrm>
-              <a:off x="3207993" y="177163"/>
-              <a:ext cx="502973" cy="502974"/>
-            </a:xfrm>
-            <a:prstGeom prst="ellipse">
-              <a:avLst/>
-            </a:prstGeom>
-            <a:solidFill>
-              <a:srgbClr val="0DE3E3"/>
-            </a:solidFill>
-            <a:ln w="50800">
-              <a:solidFill>
-                <a:srgbClr val="05314B"/>
-              </a:solidFill>
-            </a:ln>
-          </p:spPr>
-          <p:style>
-            <a:lnRef idx="2">
-              <a:schemeClr val="accent1">
-                <a:shade val="50000"/>
-              </a:schemeClr>
-            </a:lnRef>
-            <a:fillRef idx="1">
-              <a:schemeClr val="accent1"/>
-            </a:fillRef>
-            <a:effectRef idx="0">
-              <a:schemeClr val="accent1"/>
-            </a:effectRef>
-            <a:fontRef idx="minor">
-              <a:schemeClr val="lt1"/>
-            </a:fontRef>
-          </p:style>
-          <p:txBody>
-            <a:bodyPr rtlCol="0" anchor="ctr"/>
-            <a:lstStyle/>
-            <a:p>
-              <a:pPr algn="ctr"/>
-              <a:r>
-                <a:rPr lang="en-US" dirty="0">
+              <a:ln w="50800">
+                <a:solidFill>
+                  <a:srgbClr val="05314B"/>
+                </a:solidFill>
+              </a:ln>
+            </p:spPr>
+            <p:style>
+              <a:lnRef idx="2">
+                <a:schemeClr val="accent1">
+                  <a:shade val="50000"/>
+                </a:schemeClr>
+              </a:lnRef>
+              <a:fillRef idx="1">
+                <a:schemeClr val="accent1"/>
+              </a:fillRef>
+              <a:effectRef idx="0">
+                <a:schemeClr val="accent1"/>
+              </a:effectRef>
+              <a:fontRef idx="minor">
+                <a:schemeClr val="lt1"/>
+              </a:fontRef>
+            </p:style>
+            <p:txBody>
+              <a:bodyPr rtlCol="0" anchor="ctr"/>
+              <a:lstStyle/>
+              <a:p>
+                <a:pPr algn="ctr"/>
+                <a:r>
+                  <a:rPr lang="en-US" sz="1067" dirty="0">
+                    <a:ln w="0"/>
+                    <a:solidFill>
+                      <a:schemeClr val="tx1"/>
+                    </a:solidFill>
+                    <a:effectLst>
+                      <a:outerShdw blurRad="38100" dist="19050" dir="2700000" algn="tl" rotWithShape="0">
+                        <a:schemeClr val="dk1">
+                          <a:alpha val="40000"/>
+                        </a:schemeClr>
+                      </a:outerShdw>
+                    </a:effectLst>
+                  </a:rPr>
+                  <a:t>9</a:t>
+                </a:r>
+                <a:endParaRPr lang="en-US" sz="800" dirty="0">
                   <a:ln w="0"/>
                   <a:solidFill>
                     <a:schemeClr val="tx1"/>
@@ -3526,880 +4414,46 @@
                       </a:schemeClr>
                     </a:outerShdw>
                   </a:effectLst>
-                </a:rPr>
-                <a:t>6</a:t>
-              </a:r>
-            </a:p>
-          </p:txBody>
-        </p:sp>
-      </p:grpSp>
-      <p:grpSp>
-        <p:nvGrpSpPr>
-          <p:cNvPr id="16" name="Group 15"/>
-          <p:cNvGrpSpPr/>
-          <p:nvPr/>
-        </p:nvGrpSpPr>
-        <p:grpSpPr>
-          <a:xfrm>
-            <a:off x="4628230" y="1861288"/>
-            <a:ext cx="502973" cy="731769"/>
-            <a:chOff x="3207993" y="177163"/>
-            <a:chExt cx="502973" cy="731769"/>
-          </a:xfrm>
-        </p:grpSpPr>
-        <p:sp>
-          <p:nvSpPr>
-            <p:cNvPr id="17" name="Left Brace 16"/>
-            <p:cNvSpPr/>
-            <p:nvPr/>
-          </p:nvSpPr>
-          <p:spPr>
-            <a:xfrm rot="5400000">
-              <a:off x="3368040" y="588892"/>
-              <a:ext cx="182880" cy="457200"/>
-            </a:xfrm>
-            <a:prstGeom prst="leftBrace">
-              <a:avLst/>
-            </a:prstGeom>
-            <a:ln w="25400">
-              <a:solidFill>
+                </a:endParaRPr>
+              </a:p>
+            </p:txBody>
+          </p:sp>
+          <p:cxnSp>
+            <p:nvCxnSpPr>
+              <p:cNvPr id="39" name="Straight Connector 38"/>
+              <p:cNvCxnSpPr/>
+              <p:nvPr/>
+            </p:nvCxnSpPr>
+            <p:spPr>
+              <a:xfrm>
+                <a:off x="7337461" y="-69059"/>
+                <a:ext cx="0" cy="526259"/>
+              </a:xfrm>
+              <a:prstGeom prst="line">
+                <a:avLst/>
+              </a:prstGeom>
+              <a:ln w="50800">
+                <a:solidFill>
+                  <a:srgbClr val="05314B"/>
+                </a:solidFill>
+              </a:ln>
+            </p:spPr>
+            <p:style>
+              <a:lnRef idx="1">
+                <a:schemeClr val="accent1"/>
+              </a:lnRef>
+              <a:fillRef idx="0">
+                <a:schemeClr val="accent1"/>
+              </a:fillRef>
+              <a:effectRef idx="0">
+                <a:schemeClr val="accent1"/>
+              </a:effectRef>
+              <a:fontRef idx="minor">
                 <a:schemeClr val="tx1"/>
-              </a:solidFill>
-            </a:ln>
-          </p:spPr>
-          <p:style>
-            <a:lnRef idx="1">
-              <a:schemeClr val="accent1"/>
-            </a:lnRef>
-            <a:fillRef idx="0">
-              <a:schemeClr val="accent1"/>
-            </a:fillRef>
-            <a:effectRef idx="0">
-              <a:schemeClr val="accent1"/>
-            </a:effectRef>
-            <a:fontRef idx="minor">
-              <a:schemeClr val="tx1"/>
-            </a:fontRef>
-          </p:style>
-          <p:txBody>
-            <a:bodyPr rtlCol="0" anchor="ctr"/>
-            <a:lstStyle/>
-            <a:p>
-              <a:pPr algn="ctr"/>
-              <a:endParaRPr lang="en-US"/>
-            </a:p>
-          </p:txBody>
-        </p:sp>
-        <p:sp>
-          <p:nvSpPr>
-            <p:cNvPr id="18" name="Oval 17"/>
-            <p:cNvSpPr>
-              <a:spLocks/>
-            </p:cNvSpPr>
-            <p:nvPr/>
-          </p:nvSpPr>
-          <p:spPr>
-            <a:xfrm>
-              <a:off x="3207993" y="177163"/>
-              <a:ext cx="502973" cy="502974"/>
-            </a:xfrm>
-            <a:prstGeom prst="ellipse">
-              <a:avLst/>
-            </a:prstGeom>
-            <a:solidFill>
-              <a:srgbClr val="0DE3E3"/>
-            </a:solidFill>
-            <a:ln w="50800">
-              <a:solidFill>
-                <a:srgbClr val="05314B"/>
-              </a:solidFill>
-            </a:ln>
-          </p:spPr>
-          <p:style>
-            <a:lnRef idx="2">
-              <a:schemeClr val="accent1">
-                <a:shade val="50000"/>
-              </a:schemeClr>
-            </a:lnRef>
-            <a:fillRef idx="1">
-              <a:schemeClr val="accent1"/>
-            </a:fillRef>
-            <a:effectRef idx="0">
-              <a:schemeClr val="accent1"/>
-            </a:effectRef>
-            <a:fontRef idx="minor">
-              <a:schemeClr val="lt1"/>
-            </a:fontRef>
-          </p:style>
-          <p:txBody>
-            <a:bodyPr rtlCol="0" anchor="ctr"/>
-            <a:lstStyle/>
-            <a:p>
-              <a:pPr algn="ctr"/>
-              <a:r>
-                <a:rPr lang="en-US" dirty="0">
-                  <a:ln w="0"/>
-                  <a:solidFill>
-                    <a:schemeClr val="tx1"/>
-                  </a:solidFill>
-                  <a:effectLst>
-                    <a:outerShdw blurRad="38100" dist="19050" dir="2700000" algn="tl" rotWithShape="0">
-                      <a:schemeClr val="dk1">
-                        <a:alpha val="40000"/>
-                      </a:schemeClr>
-                    </a:outerShdw>
-                  </a:effectLst>
-                </a:rPr>
-                <a:t>6</a:t>
-              </a:r>
-            </a:p>
-          </p:txBody>
-        </p:sp>
-      </p:grpSp>
-      <p:grpSp>
-        <p:nvGrpSpPr>
-          <p:cNvPr id="19" name="Group 18"/>
-          <p:cNvGrpSpPr/>
-          <p:nvPr/>
-        </p:nvGrpSpPr>
-        <p:grpSpPr>
-          <a:xfrm>
-            <a:off x="5104571" y="1063806"/>
-            <a:ext cx="502973" cy="731769"/>
-            <a:chOff x="3207993" y="177163"/>
-            <a:chExt cx="502973" cy="731769"/>
-          </a:xfrm>
-        </p:grpSpPr>
-        <p:sp>
-          <p:nvSpPr>
-            <p:cNvPr id="20" name="Left Brace 19"/>
-            <p:cNvSpPr/>
-            <p:nvPr/>
-          </p:nvSpPr>
-          <p:spPr>
-            <a:xfrm rot="5400000">
-              <a:off x="3368040" y="588892"/>
-              <a:ext cx="182880" cy="457200"/>
-            </a:xfrm>
-            <a:prstGeom prst="leftBrace">
-              <a:avLst/>
-            </a:prstGeom>
-            <a:ln w="25400">
-              <a:solidFill>
-                <a:schemeClr val="tx1"/>
-              </a:solidFill>
-            </a:ln>
-          </p:spPr>
-          <p:style>
-            <a:lnRef idx="1">
-              <a:schemeClr val="accent1"/>
-            </a:lnRef>
-            <a:fillRef idx="0">
-              <a:schemeClr val="accent1"/>
-            </a:fillRef>
-            <a:effectRef idx="0">
-              <a:schemeClr val="accent1"/>
-            </a:effectRef>
-            <a:fontRef idx="minor">
-              <a:schemeClr val="tx1"/>
-            </a:fontRef>
-          </p:style>
-          <p:txBody>
-            <a:bodyPr rtlCol="0" anchor="ctr"/>
-            <a:lstStyle/>
-            <a:p>
-              <a:pPr algn="ctr"/>
-              <a:endParaRPr lang="en-US"/>
-            </a:p>
-          </p:txBody>
-        </p:sp>
-        <p:sp>
-          <p:nvSpPr>
-            <p:cNvPr id="21" name="Oval 20"/>
-            <p:cNvSpPr>
-              <a:spLocks/>
-            </p:cNvSpPr>
-            <p:nvPr/>
-          </p:nvSpPr>
-          <p:spPr>
-            <a:xfrm>
-              <a:off x="3207993" y="177163"/>
-              <a:ext cx="502973" cy="502974"/>
-            </a:xfrm>
-            <a:prstGeom prst="ellipse">
-              <a:avLst/>
-            </a:prstGeom>
-            <a:solidFill>
-              <a:srgbClr val="0DE3E3"/>
-            </a:solidFill>
-            <a:ln w="50800">
-              <a:solidFill>
-                <a:srgbClr val="05314B"/>
-              </a:solidFill>
-            </a:ln>
-          </p:spPr>
-          <p:style>
-            <a:lnRef idx="2">
-              <a:schemeClr val="accent1">
-                <a:shade val="50000"/>
-              </a:schemeClr>
-            </a:lnRef>
-            <a:fillRef idx="1">
-              <a:schemeClr val="accent1"/>
-            </a:fillRef>
-            <a:effectRef idx="0">
-              <a:schemeClr val="accent1"/>
-            </a:effectRef>
-            <a:fontRef idx="minor">
-              <a:schemeClr val="lt1"/>
-            </a:fontRef>
-          </p:style>
-          <p:txBody>
-            <a:bodyPr rtlCol="0" anchor="ctr"/>
-            <a:lstStyle/>
-            <a:p>
-              <a:pPr algn="ctr"/>
-              <a:r>
-                <a:rPr lang="en-US" dirty="0">
-                  <a:ln w="0"/>
-                  <a:solidFill>
-                    <a:schemeClr val="tx1"/>
-                  </a:solidFill>
-                  <a:effectLst>
-                    <a:outerShdw blurRad="38100" dist="19050" dir="2700000" algn="tl" rotWithShape="0">
-                      <a:schemeClr val="dk1">
-                        <a:alpha val="40000"/>
-                      </a:schemeClr>
-                    </a:outerShdw>
-                  </a:effectLst>
-                </a:rPr>
-                <a:t>6</a:t>
-              </a:r>
-            </a:p>
-          </p:txBody>
-        </p:sp>
-      </p:grpSp>
-      <p:grpSp>
-        <p:nvGrpSpPr>
-          <p:cNvPr id="22" name="Group 21"/>
-          <p:cNvGrpSpPr/>
-          <p:nvPr/>
-        </p:nvGrpSpPr>
-        <p:grpSpPr>
-          <a:xfrm>
-            <a:off x="914400" y="1358374"/>
-            <a:ext cx="502973" cy="731769"/>
-            <a:chOff x="3207993" y="177163"/>
-            <a:chExt cx="502973" cy="731769"/>
-          </a:xfrm>
-        </p:grpSpPr>
-        <p:sp>
-          <p:nvSpPr>
-            <p:cNvPr id="23" name="Left Brace 22"/>
-            <p:cNvSpPr/>
-            <p:nvPr/>
-          </p:nvSpPr>
-          <p:spPr>
-            <a:xfrm rot="5400000">
-              <a:off x="3368040" y="588892"/>
-              <a:ext cx="182880" cy="457200"/>
-            </a:xfrm>
-            <a:prstGeom prst="leftBrace">
-              <a:avLst/>
-            </a:prstGeom>
-            <a:ln w="25400">
-              <a:solidFill>
-                <a:schemeClr val="tx1"/>
-              </a:solidFill>
-            </a:ln>
-          </p:spPr>
-          <p:style>
-            <a:lnRef idx="1">
-              <a:schemeClr val="accent1"/>
-            </a:lnRef>
-            <a:fillRef idx="0">
-              <a:schemeClr val="accent1"/>
-            </a:fillRef>
-            <a:effectRef idx="0">
-              <a:schemeClr val="accent1"/>
-            </a:effectRef>
-            <a:fontRef idx="minor">
-              <a:schemeClr val="tx1"/>
-            </a:fontRef>
-          </p:style>
-          <p:txBody>
-            <a:bodyPr rtlCol="0" anchor="ctr"/>
-            <a:lstStyle/>
-            <a:p>
-              <a:pPr algn="ctr"/>
-              <a:endParaRPr lang="en-US"/>
-            </a:p>
-          </p:txBody>
-        </p:sp>
-        <p:sp>
-          <p:nvSpPr>
-            <p:cNvPr id="24" name="Oval 23"/>
-            <p:cNvSpPr>
-              <a:spLocks/>
-            </p:cNvSpPr>
-            <p:nvPr/>
-          </p:nvSpPr>
-          <p:spPr>
-            <a:xfrm>
-              <a:off x="3207993" y="177163"/>
-              <a:ext cx="502973" cy="502974"/>
-            </a:xfrm>
-            <a:prstGeom prst="ellipse">
-              <a:avLst/>
-            </a:prstGeom>
-            <a:solidFill>
-              <a:srgbClr val="0DE3E3"/>
-            </a:solidFill>
-            <a:ln w="50800">
-              <a:solidFill>
-                <a:srgbClr val="05314B"/>
-              </a:solidFill>
-            </a:ln>
-          </p:spPr>
-          <p:style>
-            <a:lnRef idx="2">
-              <a:schemeClr val="accent1">
-                <a:shade val="50000"/>
-              </a:schemeClr>
-            </a:lnRef>
-            <a:fillRef idx="1">
-              <a:schemeClr val="accent1"/>
-            </a:fillRef>
-            <a:effectRef idx="0">
-              <a:schemeClr val="accent1"/>
-            </a:effectRef>
-            <a:fontRef idx="minor">
-              <a:schemeClr val="lt1"/>
-            </a:fontRef>
-          </p:style>
-          <p:txBody>
-            <a:bodyPr rtlCol="0" anchor="ctr"/>
-            <a:lstStyle/>
-            <a:p>
-              <a:pPr algn="ctr"/>
-              <a:r>
-                <a:rPr lang="en-US" dirty="0">
-                  <a:ln w="0"/>
-                  <a:solidFill>
-                    <a:schemeClr val="tx1"/>
-                  </a:solidFill>
-                  <a:effectLst>
-                    <a:outerShdw blurRad="38100" dist="19050" dir="2700000" algn="tl" rotWithShape="0">
-                      <a:schemeClr val="dk1">
-                        <a:alpha val="40000"/>
-                      </a:schemeClr>
-                    </a:outerShdw>
-                  </a:effectLst>
-                </a:rPr>
-                <a:t>6</a:t>
-              </a:r>
-            </a:p>
-          </p:txBody>
-        </p:sp>
-      </p:grpSp>
-      <p:grpSp>
-        <p:nvGrpSpPr>
-          <p:cNvPr id="26" name="Group 25"/>
-          <p:cNvGrpSpPr/>
-          <p:nvPr/>
-        </p:nvGrpSpPr>
-        <p:grpSpPr>
-          <a:xfrm>
-            <a:off x="6019800" y="3048000"/>
-            <a:ext cx="502973" cy="1055596"/>
-            <a:chOff x="7085974" y="-95422"/>
-            <a:chExt cx="502973" cy="1055596"/>
-          </a:xfrm>
-        </p:grpSpPr>
-        <p:sp>
-          <p:nvSpPr>
-            <p:cNvPr id="27" name="Oval 26"/>
-            <p:cNvSpPr>
-              <a:spLocks/>
-            </p:cNvSpPr>
-            <p:nvPr/>
-          </p:nvSpPr>
-          <p:spPr>
-            <a:xfrm>
-              <a:off x="7085974" y="457200"/>
-              <a:ext cx="502973" cy="502974"/>
-            </a:xfrm>
-            <a:prstGeom prst="ellipse">
-              <a:avLst/>
-            </a:prstGeom>
-            <a:solidFill>
-              <a:srgbClr val="0DE3E3"/>
-            </a:solidFill>
-            <a:ln w="50800">
-              <a:solidFill>
-                <a:srgbClr val="05314B"/>
-              </a:solidFill>
-            </a:ln>
-          </p:spPr>
-          <p:style>
-            <a:lnRef idx="2">
-              <a:schemeClr val="accent1">
-                <a:shade val="50000"/>
-              </a:schemeClr>
-            </a:lnRef>
-            <a:fillRef idx="1">
-              <a:schemeClr val="accent1"/>
-            </a:fillRef>
-            <a:effectRef idx="0">
-              <a:schemeClr val="accent1"/>
-            </a:effectRef>
-            <a:fontRef idx="minor">
-              <a:schemeClr val="lt1"/>
-            </a:fontRef>
-          </p:style>
-          <p:txBody>
-            <a:bodyPr rtlCol="0" anchor="ctr"/>
-            <a:lstStyle/>
-            <a:p>
-              <a:pPr algn="ctr"/>
-              <a:r>
-                <a:rPr lang="en-US" sz="1200" dirty="0" smtClean="0">
-                  <a:ln w="0"/>
-                  <a:solidFill>
-                    <a:schemeClr val="tx1"/>
-                  </a:solidFill>
-                  <a:effectLst>
-                    <a:outerShdw blurRad="38100" dist="19050" dir="2700000" algn="tl" rotWithShape="0">
-                      <a:schemeClr val="dk1">
-                        <a:alpha val="40000"/>
-                      </a:schemeClr>
-                    </a:outerShdw>
-                  </a:effectLst>
-                </a:rPr>
-                <a:t>10</a:t>
-              </a:r>
-            </a:p>
-          </p:txBody>
-        </p:sp>
-        <p:cxnSp>
-          <p:nvCxnSpPr>
-            <p:cNvPr id="28" name="Straight Connector 27"/>
-            <p:cNvCxnSpPr/>
-            <p:nvPr/>
-          </p:nvCxnSpPr>
-          <p:spPr>
-            <a:xfrm>
-              <a:off x="7328208" y="-95422"/>
-              <a:ext cx="9253" cy="552622"/>
-            </a:xfrm>
-            <a:prstGeom prst="line">
-              <a:avLst/>
-            </a:prstGeom>
-            <a:ln w="50800">
-              <a:solidFill>
-                <a:srgbClr val="05314B"/>
-              </a:solidFill>
-            </a:ln>
-          </p:spPr>
-          <p:style>
-            <a:lnRef idx="1">
-              <a:schemeClr val="accent1"/>
-            </a:lnRef>
-            <a:fillRef idx="0">
-              <a:schemeClr val="accent1"/>
-            </a:fillRef>
-            <a:effectRef idx="0">
-              <a:schemeClr val="accent1"/>
-            </a:effectRef>
-            <a:fontRef idx="minor">
-              <a:schemeClr val="tx1"/>
-            </a:fontRef>
-          </p:style>
-        </p:cxnSp>
-      </p:grpSp>
-      <p:grpSp>
-        <p:nvGrpSpPr>
-          <p:cNvPr id="29" name="Group 28"/>
-          <p:cNvGrpSpPr/>
-          <p:nvPr/>
-        </p:nvGrpSpPr>
-        <p:grpSpPr>
-          <a:xfrm>
-            <a:off x="6834487" y="3786678"/>
-            <a:ext cx="502973" cy="779285"/>
-            <a:chOff x="7085974" y="180889"/>
-            <a:chExt cx="502973" cy="779285"/>
-          </a:xfrm>
-        </p:grpSpPr>
-        <p:sp>
-          <p:nvSpPr>
-            <p:cNvPr id="30" name="Oval 29"/>
-            <p:cNvSpPr>
-              <a:spLocks/>
-            </p:cNvSpPr>
-            <p:nvPr/>
-          </p:nvSpPr>
-          <p:spPr>
-            <a:xfrm>
-              <a:off x="7085974" y="457200"/>
-              <a:ext cx="502973" cy="502974"/>
-            </a:xfrm>
-            <a:prstGeom prst="ellipse">
-              <a:avLst/>
-            </a:prstGeom>
-            <a:solidFill>
-              <a:srgbClr val="0DE3E3"/>
-            </a:solidFill>
-            <a:ln w="50800">
-              <a:solidFill>
-                <a:srgbClr val="05314B"/>
-              </a:solidFill>
-            </a:ln>
-          </p:spPr>
-          <p:style>
-            <a:lnRef idx="2">
-              <a:schemeClr val="accent1">
-                <a:shade val="50000"/>
-              </a:schemeClr>
-            </a:lnRef>
-            <a:fillRef idx="1">
-              <a:schemeClr val="accent1"/>
-            </a:fillRef>
-            <a:effectRef idx="0">
-              <a:schemeClr val="accent1"/>
-            </a:effectRef>
-            <a:fontRef idx="minor">
-              <a:schemeClr val="lt1"/>
-            </a:fontRef>
-          </p:style>
-          <p:txBody>
-            <a:bodyPr rtlCol="0" anchor="ctr"/>
-            <a:lstStyle/>
-            <a:p>
-              <a:pPr algn="ctr"/>
-              <a:r>
-                <a:rPr lang="en-US" sz="1600" dirty="0" smtClean="0">
-                  <a:ln w="0"/>
-                  <a:solidFill>
-                    <a:schemeClr val="tx1"/>
-                  </a:solidFill>
-                  <a:effectLst>
-                    <a:outerShdw blurRad="38100" dist="19050" dir="2700000" algn="tl" rotWithShape="0">
-                      <a:schemeClr val="dk1">
-                        <a:alpha val="40000"/>
-                      </a:schemeClr>
-                    </a:outerShdw>
-                  </a:effectLst>
-                </a:rPr>
-                <a:t>1</a:t>
-              </a:r>
-              <a:endParaRPr lang="en-US" sz="1200" dirty="0" smtClean="0">
-                <a:ln w="0"/>
-                <a:solidFill>
-                  <a:schemeClr val="tx1"/>
-                </a:solidFill>
-                <a:effectLst>
-                  <a:outerShdw blurRad="38100" dist="19050" dir="2700000" algn="tl" rotWithShape="0">
-                    <a:schemeClr val="dk1">
-                      <a:alpha val="40000"/>
-                    </a:schemeClr>
-                  </a:outerShdw>
-                </a:effectLst>
-              </a:endParaRPr>
-            </a:p>
-          </p:txBody>
-        </p:sp>
-        <p:cxnSp>
-          <p:nvCxnSpPr>
-            <p:cNvPr id="31" name="Straight Connector 30"/>
-            <p:cNvCxnSpPr/>
-            <p:nvPr/>
-          </p:nvCxnSpPr>
-          <p:spPr>
-            <a:xfrm>
-              <a:off x="7337461" y="180889"/>
-              <a:ext cx="0" cy="276311"/>
-            </a:xfrm>
-            <a:prstGeom prst="line">
-              <a:avLst/>
-            </a:prstGeom>
-            <a:ln w="50800">
-              <a:solidFill>
-                <a:srgbClr val="05314B"/>
-              </a:solidFill>
-            </a:ln>
-          </p:spPr>
-          <p:style>
-            <a:lnRef idx="1">
-              <a:schemeClr val="accent1"/>
-            </a:lnRef>
-            <a:fillRef idx="0">
-              <a:schemeClr val="accent1"/>
-            </a:fillRef>
-            <a:effectRef idx="0">
-              <a:schemeClr val="accent1"/>
-            </a:effectRef>
-            <a:fontRef idx="minor">
-              <a:schemeClr val="tx1"/>
-            </a:fontRef>
-          </p:style>
-        </p:cxnSp>
-      </p:grpSp>
-      <p:grpSp>
-        <p:nvGrpSpPr>
-          <p:cNvPr id="33" name="Group 32"/>
-          <p:cNvGrpSpPr/>
-          <p:nvPr/>
-        </p:nvGrpSpPr>
-        <p:grpSpPr>
-          <a:xfrm>
-            <a:off x="7460334" y="3048000"/>
-            <a:ext cx="502973" cy="1029233"/>
-            <a:chOff x="7085974" y="-69059"/>
-            <a:chExt cx="502973" cy="1029233"/>
-          </a:xfrm>
-        </p:grpSpPr>
-        <p:sp>
-          <p:nvSpPr>
-            <p:cNvPr id="34" name="Oval 33"/>
-            <p:cNvSpPr>
-              <a:spLocks/>
-            </p:cNvSpPr>
-            <p:nvPr/>
-          </p:nvSpPr>
-          <p:spPr>
-            <a:xfrm>
-              <a:off x="7085974" y="457200"/>
-              <a:ext cx="502973" cy="502974"/>
-            </a:xfrm>
-            <a:prstGeom prst="ellipse">
-              <a:avLst/>
-            </a:prstGeom>
-            <a:solidFill>
-              <a:srgbClr val="0DE3E3"/>
-            </a:solidFill>
-            <a:ln w="50800">
-              <a:solidFill>
-                <a:srgbClr val="05314B"/>
-              </a:solidFill>
-            </a:ln>
-          </p:spPr>
-          <p:style>
-            <a:lnRef idx="2">
-              <a:schemeClr val="accent1">
-                <a:shade val="50000"/>
-              </a:schemeClr>
-            </a:lnRef>
-            <a:fillRef idx="1">
-              <a:schemeClr val="accent1"/>
-            </a:fillRef>
-            <a:effectRef idx="0">
-              <a:schemeClr val="accent1"/>
-            </a:effectRef>
-            <a:fontRef idx="minor">
-              <a:schemeClr val="lt1"/>
-            </a:fontRef>
-          </p:style>
-          <p:txBody>
-            <a:bodyPr rtlCol="0" anchor="ctr"/>
-            <a:lstStyle/>
-            <a:p>
-              <a:pPr algn="ctr"/>
-              <a:r>
-                <a:rPr lang="en-US" sz="1600" dirty="0">
-                  <a:ln w="0"/>
-                  <a:solidFill>
-                    <a:schemeClr val="tx1"/>
-                  </a:solidFill>
-                  <a:effectLst>
-                    <a:outerShdw blurRad="38100" dist="19050" dir="2700000" algn="tl" rotWithShape="0">
-                      <a:schemeClr val="dk1">
-                        <a:alpha val="40000"/>
-                      </a:schemeClr>
-                    </a:outerShdw>
-                  </a:effectLst>
-                </a:rPr>
-                <a:t>8</a:t>
-              </a:r>
-              <a:endParaRPr lang="en-US" sz="1200" dirty="0" smtClean="0">
-                <a:ln w="0"/>
-                <a:solidFill>
-                  <a:schemeClr val="tx1"/>
-                </a:solidFill>
-                <a:effectLst>
-                  <a:outerShdw blurRad="38100" dist="19050" dir="2700000" algn="tl" rotWithShape="0">
-                    <a:schemeClr val="dk1">
-                      <a:alpha val="40000"/>
-                    </a:schemeClr>
-                  </a:outerShdw>
-                </a:effectLst>
-              </a:endParaRPr>
-            </a:p>
-          </p:txBody>
-        </p:sp>
-        <p:cxnSp>
-          <p:nvCxnSpPr>
-            <p:cNvPr id="35" name="Straight Connector 34"/>
-            <p:cNvCxnSpPr/>
-            <p:nvPr/>
-          </p:nvCxnSpPr>
-          <p:spPr>
-            <a:xfrm>
-              <a:off x="7337461" y="-69059"/>
-              <a:ext cx="0" cy="526259"/>
-            </a:xfrm>
-            <a:prstGeom prst="line">
-              <a:avLst/>
-            </a:prstGeom>
-            <a:ln w="50800">
-              <a:solidFill>
-                <a:srgbClr val="05314B"/>
-              </a:solidFill>
-            </a:ln>
-          </p:spPr>
-          <p:style>
-            <a:lnRef idx="1">
-              <a:schemeClr val="accent1"/>
-            </a:lnRef>
-            <a:fillRef idx="0">
-              <a:schemeClr val="accent1"/>
-            </a:fillRef>
-            <a:effectRef idx="0">
-              <a:schemeClr val="accent1"/>
-            </a:effectRef>
-            <a:fontRef idx="minor">
-              <a:schemeClr val="tx1"/>
-            </a:fontRef>
-          </p:style>
-        </p:cxnSp>
-      </p:grpSp>
-      <p:grpSp>
-        <p:nvGrpSpPr>
-          <p:cNvPr id="37" name="Group 36"/>
-          <p:cNvGrpSpPr/>
-          <p:nvPr/>
-        </p:nvGrpSpPr>
-        <p:grpSpPr>
-          <a:xfrm>
-            <a:off x="8229600" y="2721135"/>
-            <a:ext cx="502973" cy="1029233"/>
-            <a:chOff x="7085974" y="-69059"/>
-            <a:chExt cx="502973" cy="1029233"/>
-          </a:xfrm>
-        </p:grpSpPr>
-        <p:sp>
-          <p:nvSpPr>
-            <p:cNvPr id="38" name="Oval 37"/>
-            <p:cNvSpPr>
-              <a:spLocks/>
-            </p:cNvSpPr>
-            <p:nvPr/>
-          </p:nvSpPr>
-          <p:spPr>
-            <a:xfrm>
-              <a:off x="7085974" y="457200"/>
-              <a:ext cx="502973" cy="502974"/>
-            </a:xfrm>
-            <a:prstGeom prst="ellipse">
-              <a:avLst/>
-            </a:prstGeom>
-            <a:solidFill>
-              <a:srgbClr val="0DE3E3"/>
-            </a:solidFill>
-            <a:ln w="50800">
-              <a:solidFill>
-                <a:srgbClr val="05314B"/>
-              </a:solidFill>
-            </a:ln>
-          </p:spPr>
-          <p:style>
-            <a:lnRef idx="2">
-              <a:schemeClr val="accent1">
-                <a:shade val="50000"/>
-              </a:schemeClr>
-            </a:lnRef>
-            <a:fillRef idx="1">
-              <a:schemeClr val="accent1"/>
-            </a:fillRef>
-            <a:effectRef idx="0">
-              <a:schemeClr val="accent1"/>
-            </a:effectRef>
-            <a:fontRef idx="minor">
-              <a:schemeClr val="lt1"/>
-            </a:fontRef>
-          </p:style>
-          <p:txBody>
-            <a:bodyPr rtlCol="0" anchor="ctr"/>
-            <a:lstStyle/>
-            <a:p>
-              <a:pPr algn="ctr"/>
-              <a:r>
-                <a:rPr lang="en-US" sz="1600" dirty="0" smtClean="0">
-                  <a:ln w="0"/>
-                  <a:solidFill>
-                    <a:schemeClr val="tx1"/>
-                  </a:solidFill>
-                  <a:effectLst>
-                    <a:outerShdw blurRad="38100" dist="19050" dir="2700000" algn="tl" rotWithShape="0">
-                      <a:schemeClr val="dk1">
-                        <a:alpha val="40000"/>
-                      </a:schemeClr>
-                    </a:outerShdw>
-                  </a:effectLst>
-                </a:rPr>
-                <a:t>9</a:t>
-              </a:r>
-              <a:endParaRPr lang="en-US" sz="1200" dirty="0" smtClean="0">
-                <a:ln w="0"/>
-                <a:solidFill>
-                  <a:schemeClr val="tx1"/>
-                </a:solidFill>
-                <a:effectLst>
-                  <a:outerShdw blurRad="38100" dist="19050" dir="2700000" algn="tl" rotWithShape="0">
-                    <a:schemeClr val="dk1">
-                      <a:alpha val="40000"/>
-                    </a:schemeClr>
-                  </a:outerShdw>
-                </a:effectLst>
-              </a:endParaRPr>
-            </a:p>
-          </p:txBody>
-        </p:sp>
-        <p:cxnSp>
-          <p:nvCxnSpPr>
-            <p:cNvPr id="39" name="Straight Connector 38"/>
-            <p:cNvCxnSpPr/>
-            <p:nvPr/>
-          </p:nvCxnSpPr>
-          <p:spPr>
-            <a:xfrm>
-              <a:off x="7337461" y="-69059"/>
-              <a:ext cx="0" cy="526259"/>
-            </a:xfrm>
-            <a:prstGeom prst="line">
-              <a:avLst/>
-            </a:prstGeom>
-            <a:ln w="50800">
-              <a:solidFill>
-                <a:srgbClr val="05314B"/>
-              </a:solidFill>
-            </a:ln>
-          </p:spPr>
-          <p:style>
-            <a:lnRef idx="1">
-              <a:schemeClr val="accent1"/>
-            </a:lnRef>
-            <a:fillRef idx="0">
-              <a:schemeClr val="accent1"/>
-            </a:fillRef>
-            <a:effectRef idx="0">
-              <a:schemeClr val="accent1"/>
-            </a:effectRef>
-            <a:fontRef idx="minor">
-              <a:schemeClr val="tx1"/>
-            </a:fontRef>
-          </p:style>
-        </p:cxnSp>
+              </a:fontRef>
+            </p:style>
+          </p:cxnSp>
+        </p:grpSp>
       </p:grpSp>
     </p:spTree>
     <p:extLst>

</xml_diff>